<commit_message>
feature: Updated simple texter example program
</commit_message>
<xml_diff>
--- a/My Robot Friend - Alexa.js.pptx
+++ b/My Robot Friend - Alexa.js.pptx
@@ -5029,6 +5029,60 @@
           </a:p>
         </p:txBody>
       </p:sp>
+      <p:pic>
+        <p:nvPicPr>
+          <p:cNvPr id="3074" name="Picture 2"/>
+          <p:cNvPicPr>
+            <a:picLocks noChangeAspect="1" noChangeArrowheads="1"/>
+          </p:cNvPicPr>
+          <p:nvPr/>
+        </p:nvPicPr>
+        <p:blipFill>
+          <a:blip r:embed="rId2" cstate="print">
+            <a:extLst>
+              <a:ext uri="{28A0092B-C50C-407E-A947-70E740481C1C}">
+                <a14:useLocalDpi xmlns:a14="http://schemas.microsoft.com/office/drawing/2010/main" val="0"/>
+              </a:ext>
+            </a:extLst>
+          </a:blip>
+          <a:srcRect/>
+          <a:stretch>
+            <a:fillRect/>
+          </a:stretch>
+        </p:blipFill>
+        <p:spPr bwMode="auto">
+          <a:xfrm>
+            <a:off x="1371600" y="1171575"/>
+            <a:ext cx="6899151" cy="5686425"/>
+          </a:xfrm>
+          <a:prstGeom prst="rect">
+            <a:avLst/>
+          </a:prstGeom>
+          <a:noFill/>
+          <a:ln>
+            <a:noFill/>
+          </a:ln>
+          <a:extLst>
+            <a:ext uri="{909E8E84-426E-40DD-AFC4-6F175D3DCCD1}">
+              <a14:hiddenFill xmlns:a14="http://schemas.microsoft.com/office/drawing/2010/main">
+                <a:solidFill>
+                  <a:schemeClr val="accent1"/>
+                </a:solidFill>
+              </a14:hiddenFill>
+            </a:ext>
+            <a:ext uri="{91240B29-F687-4F45-9708-019B960494DF}">
+              <a14:hiddenLine xmlns:a14="http://schemas.microsoft.com/office/drawing/2010/main" w="9525">
+                <a:solidFill>
+                  <a:schemeClr val="tx1"/>
+                </a:solidFill>
+                <a:miter lim="800000"/>
+                <a:headEnd/>
+                <a:tailEnd/>
+              </a14:hiddenLine>
+            </a:ext>
+          </a:extLst>
+        </p:spPr>
+      </p:pic>
     </p:spTree>
     <p:extLst>
       <p:ext uri="{BB962C8B-B14F-4D97-AF65-F5344CB8AC3E}">

</xml_diff>

<commit_message>
feature: Got custom slots and advanced texter example done and working
</commit_message>
<xml_diff>
--- a/My Robot Friend - Alexa.js.pptx
+++ b/My Robot Friend - Alexa.js.pptx
@@ -23,6 +23,8 @@
     <p:sldId id="272" r:id="rId17"/>
     <p:sldId id="273" r:id="rId18"/>
     <p:sldId id="269" r:id="rId19"/>
+    <p:sldId id="274" r:id="rId20"/>
+    <p:sldId id="275" r:id="rId21"/>
   </p:sldIdLst>
   <p:sldSz cx="9144000" cy="6858000" type="screen4x3"/>
   <p:notesSz cx="6858000" cy="9144000"/>
@@ -5031,7 +5033,7 @@
       </p:sp>
       <p:pic>
         <p:nvPicPr>
-          <p:cNvPr id="3074" name="Picture 2"/>
+          <p:cNvPr id="3" name="Picture 2"/>
           <p:cNvPicPr>
             <a:picLocks noChangeAspect="1" noChangeArrowheads="1"/>
           </p:cNvPicPr>
@@ -5052,8 +5054,8 @@
         </p:blipFill>
         <p:spPr bwMode="auto">
           <a:xfrm>
-            <a:off x="1371600" y="1171575"/>
-            <a:ext cx="6899151" cy="5686425"/>
+            <a:off x="1447800" y="1219200"/>
+            <a:ext cx="6538913" cy="5303242"/>
           </a:xfrm>
           <a:prstGeom prst="rect">
             <a:avLst/>
@@ -5161,10 +5163,204 @@
           </a:p>
         </p:txBody>
       </p:sp>
+      <p:pic>
+        <p:nvPicPr>
+          <p:cNvPr id="1026" name="Picture 2"/>
+          <p:cNvPicPr>
+            <a:picLocks noChangeAspect="1" noChangeArrowheads="1"/>
+          </p:cNvPicPr>
+          <p:nvPr/>
+        </p:nvPicPr>
+        <p:blipFill>
+          <a:blip r:embed="rId2">
+            <a:extLst>
+              <a:ext uri="{28A0092B-C50C-407E-A947-70E740481C1C}">
+                <a14:useLocalDpi xmlns:a14="http://schemas.microsoft.com/office/drawing/2010/main" val="0"/>
+              </a:ext>
+            </a:extLst>
+          </a:blip>
+          <a:srcRect/>
+          <a:stretch>
+            <a:fillRect/>
+          </a:stretch>
+        </p:blipFill>
+        <p:spPr bwMode="auto">
+          <a:xfrm>
+            <a:off x="609600" y="1295400"/>
+            <a:ext cx="8005763" cy="4852987"/>
+          </a:xfrm>
+          <a:prstGeom prst="rect">
+            <a:avLst/>
+          </a:prstGeom>
+          <a:noFill/>
+          <a:ln>
+            <a:noFill/>
+          </a:ln>
+          <a:extLst>
+            <a:ext uri="{909E8E84-426E-40DD-AFC4-6F175D3DCCD1}">
+              <a14:hiddenFill xmlns:a14="http://schemas.microsoft.com/office/drawing/2010/main">
+                <a:solidFill>
+                  <a:schemeClr val="accent1"/>
+                </a:solidFill>
+              </a14:hiddenFill>
+            </a:ext>
+            <a:ext uri="{91240B29-F687-4F45-9708-019B960494DF}">
+              <a14:hiddenLine xmlns:a14="http://schemas.microsoft.com/office/drawing/2010/main" w="9525">
+                <a:solidFill>
+                  <a:schemeClr val="tx1"/>
+                </a:solidFill>
+                <a:miter lim="800000"/>
+                <a:headEnd/>
+                <a:tailEnd/>
+              </a14:hiddenLine>
+            </a:ext>
+          </a:extLst>
+        </p:spPr>
+      </p:pic>
     </p:spTree>
     <p:extLst>
       <p:ext uri="{BB962C8B-B14F-4D97-AF65-F5344CB8AC3E}">
         <p14:creationId xmlns:p14="http://schemas.microsoft.com/office/powerpoint/2010/main" val="1349819196"/>
+      </p:ext>
+    </p:extLst>
+  </p:cSld>
+  <p:clrMapOvr>
+    <a:masterClrMapping/>
+  </p:clrMapOvr>
+  <p:timing>
+    <p:tnLst>
+      <p:par>
+        <p:cTn id="1" dur="indefinite" restart="never" nodeType="tmRoot"/>
+      </p:par>
+    </p:tnLst>
+  </p:timing>
+</p:sld>
+</file>
+
+<file path=ppt/slides/slide19.xml><?xml version="1.0" encoding="utf-8"?>
+<p:sld xmlns:a="http://schemas.openxmlformats.org/drawingml/2006/main" xmlns:r="http://schemas.openxmlformats.org/officeDocument/2006/relationships" xmlns:p="http://schemas.openxmlformats.org/presentationml/2006/main">
+  <p:cSld>
+    <p:bg>
+      <p:bgPr>
+        <a:solidFill>
+          <a:srgbClr val="333333"/>
+        </a:solidFill>
+        <a:effectLst/>
+      </p:bgPr>
+    </p:bg>
+    <p:spTree>
+      <p:nvGrpSpPr>
+        <p:cNvPr id="1" name=""/>
+        <p:cNvGrpSpPr/>
+        <p:nvPr/>
+      </p:nvGrpSpPr>
+      <p:grpSpPr>
+        <a:xfrm>
+          <a:off x="0" y="0"/>
+          <a:ext cx="0" cy="0"/>
+          <a:chOff x="0" y="0"/>
+          <a:chExt cx="0" cy="0"/>
+        </a:xfrm>
+      </p:grpSpPr>
+      <p:sp>
+        <p:nvSpPr>
+          <p:cNvPr id="2" name="Title 1"/>
+          <p:cNvSpPr>
+            <a:spLocks noGrp="1"/>
+          </p:cNvSpPr>
+          <p:nvPr>
+            <p:ph type="title"/>
+          </p:nvPr>
+        </p:nvSpPr>
+        <p:spPr/>
+        <p:txBody>
+          <a:bodyPr>
+            <a:normAutofit/>
+          </a:bodyPr>
+          <a:lstStyle/>
+          <a:p>
+            <a:r>
+              <a:rPr lang="en-US" dirty="0" smtClean="0">
+                <a:solidFill>
+                  <a:schemeClr val="bg1"/>
+                </a:solidFill>
+              </a:rPr>
+              <a:t>Expanding on simple </a:t>
+            </a:r>
+            <a:r>
+              <a:rPr lang="en-US" dirty="0" err="1" smtClean="0">
+                <a:solidFill>
+                  <a:schemeClr val="bg1"/>
+                </a:solidFill>
+              </a:rPr>
+              <a:t>texter</a:t>
+            </a:r>
+            <a:endParaRPr lang="en-US" dirty="0">
+              <a:solidFill>
+                <a:schemeClr val="bg1"/>
+              </a:solidFill>
+            </a:endParaRPr>
+          </a:p>
+        </p:txBody>
+      </p:sp>
+      <p:pic>
+        <p:nvPicPr>
+          <p:cNvPr id="2051" name="Picture 3"/>
+          <p:cNvPicPr>
+            <a:picLocks noChangeAspect="1" noChangeArrowheads="1"/>
+          </p:cNvPicPr>
+          <p:nvPr/>
+        </p:nvPicPr>
+        <p:blipFill>
+          <a:blip r:embed="rId2" cstate="print">
+            <a:extLst>
+              <a:ext uri="{28A0092B-C50C-407E-A947-70E740481C1C}">
+                <a14:useLocalDpi xmlns:a14="http://schemas.microsoft.com/office/drawing/2010/main" val="0"/>
+              </a:ext>
+            </a:extLst>
+          </a:blip>
+          <a:srcRect/>
+          <a:stretch>
+            <a:fillRect/>
+          </a:stretch>
+        </p:blipFill>
+        <p:spPr bwMode="auto">
+          <a:xfrm>
+            <a:off x="1600200" y="1219200"/>
+            <a:ext cx="5943600" cy="5564222"/>
+          </a:xfrm>
+          <a:prstGeom prst="rect">
+            <a:avLst/>
+          </a:prstGeom>
+          <a:noFill/>
+          <a:ln>
+            <a:noFill/>
+          </a:ln>
+          <a:extLst>
+            <a:ext uri="{909E8E84-426E-40DD-AFC4-6F175D3DCCD1}">
+              <a14:hiddenFill xmlns:a14="http://schemas.microsoft.com/office/drawing/2010/main">
+                <a:solidFill>
+                  <a:schemeClr val="accent1"/>
+                </a:solidFill>
+              </a14:hiddenFill>
+            </a:ext>
+            <a:ext uri="{91240B29-F687-4F45-9708-019B960494DF}">
+              <a14:hiddenLine xmlns:a14="http://schemas.microsoft.com/office/drawing/2010/main" w="9525">
+                <a:solidFill>
+                  <a:schemeClr val="tx1"/>
+                </a:solidFill>
+                <a:miter lim="800000"/>
+                <a:headEnd/>
+                <a:tailEnd/>
+              </a14:hiddenLine>
+            </a:ext>
+          </a:extLst>
+        </p:spPr>
+      </p:pic>
+    </p:spTree>
+    <p:extLst>
+      <p:ext uri="{BB962C8B-B14F-4D97-AF65-F5344CB8AC3E}">
+        <p14:creationId xmlns:p14="http://schemas.microsoft.com/office/powerpoint/2010/main" val="2770146145"/>
       </p:ext>
     </p:extLst>
   </p:cSld>
@@ -5503,6 +5699,146 @@
     <p:extLst>
       <p:ext uri="{BB962C8B-B14F-4D97-AF65-F5344CB8AC3E}">
         <p14:creationId xmlns:p14="http://schemas.microsoft.com/office/powerpoint/2010/main" val="2666622517"/>
+      </p:ext>
+    </p:extLst>
+  </p:cSld>
+  <p:clrMapOvr>
+    <a:masterClrMapping/>
+  </p:clrMapOvr>
+  <p:timing>
+    <p:tnLst>
+      <p:par>
+        <p:cTn id="1" dur="indefinite" restart="never" nodeType="tmRoot"/>
+      </p:par>
+    </p:tnLst>
+  </p:timing>
+</p:sld>
+</file>
+
+<file path=ppt/slides/slide20.xml><?xml version="1.0" encoding="utf-8"?>
+<p:sld xmlns:a="http://schemas.openxmlformats.org/drawingml/2006/main" xmlns:r="http://schemas.openxmlformats.org/officeDocument/2006/relationships" xmlns:p="http://schemas.openxmlformats.org/presentationml/2006/main">
+  <p:cSld>
+    <p:bg>
+      <p:bgPr>
+        <a:solidFill>
+          <a:srgbClr val="333333"/>
+        </a:solidFill>
+        <a:effectLst/>
+      </p:bgPr>
+    </p:bg>
+    <p:spTree>
+      <p:nvGrpSpPr>
+        <p:cNvPr id="1" name=""/>
+        <p:cNvGrpSpPr/>
+        <p:nvPr/>
+      </p:nvGrpSpPr>
+      <p:grpSpPr>
+        <a:xfrm>
+          <a:off x="0" y="0"/>
+          <a:ext cx="0" cy="0"/>
+          <a:chOff x="0" y="0"/>
+          <a:chExt cx="0" cy="0"/>
+        </a:xfrm>
+      </p:grpSpPr>
+      <p:sp>
+        <p:nvSpPr>
+          <p:cNvPr id="2" name="Title 1"/>
+          <p:cNvSpPr>
+            <a:spLocks noGrp="1"/>
+          </p:cNvSpPr>
+          <p:nvPr>
+            <p:ph type="title"/>
+          </p:nvPr>
+        </p:nvSpPr>
+        <p:spPr/>
+        <p:txBody>
+          <a:bodyPr>
+            <a:normAutofit/>
+          </a:bodyPr>
+          <a:lstStyle/>
+          <a:p>
+            <a:r>
+              <a:rPr lang="en-US" dirty="0" smtClean="0">
+                <a:solidFill>
+                  <a:schemeClr val="bg1"/>
+                </a:solidFill>
+              </a:rPr>
+              <a:t>Advanced </a:t>
+            </a:r>
+            <a:r>
+              <a:rPr lang="en-US" dirty="0" err="1" smtClean="0">
+                <a:solidFill>
+                  <a:schemeClr val="bg1"/>
+                </a:solidFill>
+              </a:rPr>
+              <a:t>Texter</a:t>
+            </a:r>
+            <a:endParaRPr lang="en-US" dirty="0">
+              <a:solidFill>
+                <a:schemeClr val="bg1"/>
+              </a:solidFill>
+            </a:endParaRPr>
+          </a:p>
+        </p:txBody>
+      </p:sp>
+      <p:pic>
+        <p:nvPicPr>
+          <p:cNvPr id="4100" name="Picture 4"/>
+          <p:cNvPicPr>
+            <a:picLocks noChangeAspect="1" noChangeArrowheads="1"/>
+          </p:cNvPicPr>
+          <p:nvPr/>
+        </p:nvPicPr>
+        <p:blipFill>
+          <a:blip r:embed="rId2" cstate="print">
+            <a:extLst>
+              <a:ext uri="{28A0092B-C50C-407E-A947-70E740481C1C}">
+                <a14:useLocalDpi xmlns:a14="http://schemas.microsoft.com/office/drawing/2010/main" val="0"/>
+              </a:ext>
+            </a:extLst>
+          </a:blip>
+          <a:srcRect/>
+          <a:stretch>
+            <a:fillRect/>
+          </a:stretch>
+        </p:blipFill>
+        <p:spPr bwMode="auto">
+          <a:xfrm>
+            <a:off x="762000" y="1219200"/>
+            <a:ext cx="7898892" cy="5410200"/>
+          </a:xfrm>
+          <a:prstGeom prst="rect">
+            <a:avLst/>
+          </a:prstGeom>
+          <a:noFill/>
+          <a:ln>
+            <a:noFill/>
+          </a:ln>
+          <a:extLst>
+            <a:ext uri="{909E8E84-426E-40DD-AFC4-6F175D3DCCD1}">
+              <a14:hiddenFill xmlns:a14="http://schemas.microsoft.com/office/drawing/2010/main">
+                <a:solidFill>
+                  <a:schemeClr val="accent1"/>
+                </a:solidFill>
+              </a14:hiddenFill>
+            </a:ext>
+            <a:ext uri="{91240B29-F687-4F45-9708-019B960494DF}">
+              <a14:hiddenLine xmlns:a14="http://schemas.microsoft.com/office/drawing/2010/main" w="9525">
+                <a:solidFill>
+                  <a:schemeClr val="tx1"/>
+                </a:solidFill>
+                <a:miter lim="800000"/>
+                <a:headEnd/>
+                <a:tailEnd/>
+              </a14:hiddenLine>
+            </a:ext>
+          </a:extLst>
+        </p:spPr>
+      </p:pic>
+    </p:spTree>
+    <p:extLst>
+      <p:ext uri="{BB962C8B-B14F-4D97-AF65-F5344CB8AC3E}">
+        <p14:creationId xmlns:p14="http://schemas.microsoft.com/office/powerpoint/2010/main" val="2372961381"/>
       </p:ext>
     </p:extLst>
   </p:cSld>

</xml_diff>

<commit_message>
feature: Finishing up, trying to tie in a last minute adventure game
</commit_message>
<xml_diff>
--- a/My Robot Friend - Alexa.js.pptx
+++ b/My Robot Friend - Alexa.js.pptx
@@ -14,17 +14,17 @@
     <p:sldId id="262" r:id="rId8"/>
     <p:sldId id="263" r:id="rId9"/>
     <p:sldId id="264" r:id="rId10"/>
-    <p:sldId id="266" r:id="rId11"/>
-    <p:sldId id="265" r:id="rId12"/>
-    <p:sldId id="268" r:id="rId13"/>
-    <p:sldId id="270" r:id="rId14"/>
-    <p:sldId id="267" r:id="rId15"/>
-    <p:sldId id="271" r:id="rId16"/>
-    <p:sldId id="272" r:id="rId17"/>
-    <p:sldId id="273" r:id="rId18"/>
-    <p:sldId id="269" r:id="rId19"/>
-    <p:sldId id="274" r:id="rId20"/>
-    <p:sldId id="275" r:id="rId21"/>
+    <p:sldId id="269" r:id="rId11"/>
+    <p:sldId id="266" r:id="rId12"/>
+    <p:sldId id="274" r:id="rId13"/>
+    <p:sldId id="265" r:id="rId14"/>
+    <p:sldId id="268" r:id="rId15"/>
+    <p:sldId id="270" r:id="rId16"/>
+    <p:sldId id="267" r:id="rId17"/>
+    <p:sldId id="271" r:id="rId18"/>
+    <p:sldId id="272" r:id="rId19"/>
+    <p:sldId id="275" r:id="rId20"/>
+    <p:sldId id="276" r:id="rId21"/>
   </p:sldIdLst>
   <p:sldSz cx="9144000" cy="6858000" type="screen4x3"/>
   <p:notesSz cx="6858000" cy="9144000"/>
@@ -307,7 +307,7 @@
           <a:p>
             <a:fld id="{75A3C5B4-6199-4031-B143-8199622DDC1A}" type="datetimeFigureOut">
               <a:rPr lang="en-US" smtClean="0"/>
-              <a:t>8/6/2016</a:t>
+              <a:t>8/10/2016</a:t>
             </a:fld>
             <a:endParaRPr lang="en-US"/>
           </a:p>
@@ -477,7 +477,7 @@
           <a:p>
             <a:fld id="{75A3C5B4-6199-4031-B143-8199622DDC1A}" type="datetimeFigureOut">
               <a:rPr lang="en-US" smtClean="0"/>
-              <a:t>8/6/2016</a:t>
+              <a:t>8/10/2016</a:t>
             </a:fld>
             <a:endParaRPr lang="en-US"/>
           </a:p>
@@ -657,7 +657,7 @@
           <a:p>
             <a:fld id="{75A3C5B4-6199-4031-B143-8199622DDC1A}" type="datetimeFigureOut">
               <a:rPr lang="en-US" smtClean="0"/>
-              <a:t>8/6/2016</a:t>
+              <a:t>8/10/2016</a:t>
             </a:fld>
             <a:endParaRPr lang="en-US"/>
           </a:p>
@@ -827,7 +827,7 @@
           <a:p>
             <a:fld id="{75A3C5B4-6199-4031-B143-8199622DDC1A}" type="datetimeFigureOut">
               <a:rPr lang="en-US" smtClean="0"/>
-              <a:t>8/6/2016</a:t>
+              <a:t>8/10/2016</a:t>
             </a:fld>
             <a:endParaRPr lang="en-US"/>
           </a:p>
@@ -1073,7 +1073,7 @@
           <a:p>
             <a:fld id="{75A3C5B4-6199-4031-B143-8199622DDC1A}" type="datetimeFigureOut">
               <a:rPr lang="en-US" smtClean="0"/>
-              <a:t>8/6/2016</a:t>
+              <a:t>8/10/2016</a:t>
             </a:fld>
             <a:endParaRPr lang="en-US"/>
           </a:p>
@@ -1361,7 +1361,7 @@
           <a:p>
             <a:fld id="{75A3C5B4-6199-4031-B143-8199622DDC1A}" type="datetimeFigureOut">
               <a:rPr lang="en-US" smtClean="0"/>
-              <a:t>8/6/2016</a:t>
+              <a:t>8/10/2016</a:t>
             </a:fld>
             <a:endParaRPr lang="en-US"/>
           </a:p>
@@ -1783,7 +1783,7 @@
           <a:p>
             <a:fld id="{75A3C5B4-6199-4031-B143-8199622DDC1A}" type="datetimeFigureOut">
               <a:rPr lang="en-US" smtClean="0"/>
-              <a:t>8/6/2016</a:t>
+              <a:t>8/10/2016</a:t>
             </a:fld>
             <a:endParaRPr lang="en-US"/>
           </a:p>
@@ -1901,7 +1901,7 @@
           <a:p>
             <a:fld id="{75A3C5B4-6199-4031-B143-8199622DDC1A}" type="datetimeFigureOut">
               <a:rPr lang="en-US" smtClean="0"/>
-              <a:t>8/6/2016</a:t>
+              <a:t>8/10/2016</a:t>
             </a:fld>
             <a:endParaRPr lang="en-US"/>
           </a:p>
@@ -1996,7 +1996,7 @@
           <a:p>
             <a:fld id="{75A3C5B4-6199-4031-B143-8199622DDC1A}" type="datetimeFigureOut">
               <a:rPr lang="en-US" smtClean="0"/>
-              <a:t>8/6/2016</a:t>
+              <a:t>8/10/2016</a:t>
             </a:fld>
             <a:endParaRPr lang="en-US"/>
           </a:p>
@@ -2273,7 +2273,7 @@
           <a:p>
             <a:fld id="{75A3C5B4-6199-4031-B143-8199622DDC1A}" type="datetimeFigureOut">
               <a:rPr lang="en-US" smtClean="0"/>
-              <a:t>8/6/2016</a:t>
+              <a:t>8/10/2016</a:t>
             </a:fld>
             <a:endParaRPr lang="en-US"/>
           </a:p>
@@ -2526,7 +2526,7 @@
           <a:p>
             <a:fld id="{75A3C5B4-6199-4031-B143-8199622DDC1A}" type="datetimeFigureOut">
               <a:rPr lang="en-US" smtClean="0"/>
-              <a:t>8/6/2016</a:t>
+              <a:t>8/10/2016</a:t>
             </a:fld>
             <a:endParaRPr lang="en-US"/>
           </a:p>
@@ -2739,7 +2739,7 @@
           <a:p>
             <a:fld id="{75A3C5B4-6199-4031-B143-8199622DDC1A}" type="datetimeFigureOut">
               <a:rPr lang="en-US" smtClean="0"/>
-              <a:t>8/6/2016</a:t>
+              <a:t>8/10/2016</a:t>
             </a:fld>
             <a:endParaRPr lang="en-US"/>
           </a:p>
@@ -3441,15 +3441,7 @@
                   <a:schemeClr val="bg1"/>
                 </a:solidFill>
               </a:rPr>
-              <a:t>Sample </a:t>
-            </a:r>
-            <a:r>
-              <a:rPr lang="en-US" dirty="0" err="1" smtClean="0">
-                <a:solidFill>
-                  <a:schemeClr val="bg1"/>
-                </a:solidFill>
-              </a:rPr>
-              <a:t>Occurences</a:t>
+              <a:t>Making a custom slot</a:t>
             </a:r>
             <a:endParaRPr lang="en-US" dirty="0">
               <a:solidFill>
@@ -3459,130 +3451,9 @@
           </a:p>
         </p:txBody>
       </p:sp>
-      <p:sp>
-        <p:nvSpPr>
-          <p:cNvPr id="7" name="Content Placeholder 6"/>
-          <p:cNvSpPr>
-            <a:spLocks noGrp="1"/>
-          </p:cNvSpPr>
-          <p:nvPr>
-            <p:ph idx="1"/>
-          </p:nvPr>
-        </p:nvSpPr>
-        <p:spPr/>
-        <p:txBody>
-          <a:bodyPr>
-            <a:normAutofit/>
-          </a:bodyPr>
-          <a:lstStyle/>
-          <a:p>
-            <a:pPr marL="0" indent="0" algn="ctr">
-              <a:buNone/>
-            </a:pPr>
-            <a:r>
-              <a:rPr lang="en-US" dirty="0" smtClean="0">
-                <a:solidFill>
-                  <a:schemeClr val="bg1"/>
-                </a:solidFill>
-              </a:rPr>
-              <a:t>These will map intents for your skill to sample utterance</a:t>
-            </a:r>
-          </a:p>
-          <a:p>
-            <a:pPr marL="0" indent="0" algn="ctr">
-              <a:buNone/>
-            </a:pPr>
-            <a:endParaRPr lang="en-US" dirty="0">
-              <a:solidFill>
-                <a:schemeClr val="bg1"/>
-              </a:solidFill>
-            </a:endParaRPr>
-          </a:p>
-          <a:p>
-            <a:pPr marL="0" indent="0" algn="ctr">
-              <a:buNone/>
-            </a:pPr>
-            <a:endParaRPr lang="en-US" dirty="0" smtClean="0">
-              <a:solidFill>
-                <a:schemeClr val="bg1"/>
-              </a:solidFill>
-            </a:endParaRPr>
-          </a:p>
-          <a:p>
-            <a:pPr marL="0" indent="0" algn="ctr">
-              <a:buNone/>
-            </a:pPr>
-            <a:endParaRPr lang="en-US" dirty="0">
-              <a:solidFill>
-                <a:schemeClr val="bg1"/>
-              </a:solidFill>
-            </a:endParaRPr>
-          </a:p>
-          <a:p>
-            <a:pPr marL="0" indent="0" algn="ctr">
-              <a:buNone/>
-            </a:pPr>
-            <a:endParaRPr lang="en-US" sz="2800" dirty="0" smtClean="0">
-              <a:solidFill>
-                <a:schemeClr val="bg1"/>
-              </a:solidFill>
-            </a:endParaRPr>
-          </a:p>
-          <a:p>
-            <a:pPr marL="0" indent="0" algn="ctr">
-              <a:buNone/>
-            </a:pPr>
-            <a:r>
-              <a:rPr lang="en-US" sz="2800" dirty="0" smtClean="0">
-                <a:solidFill>
-                  <a:schemeClr val="bg1"/>
-                </a:solidFill>
-              </a:rPr>
-              <a:t>Use </a:t>
-            </a:r>
-            <a:r>
-              <a:rPr lang="en-US" sz="2800" dirty="0" smtClean="0">
-                <a:solidFill>
-                  <a:srgbClr val="C00000"/>
-                </a:solidFill>
-              </a:rPr>
-              <a:t>{</a:t>
-            </a:r>
-            <a:r>
-              <a:rPr lang="en-US" sz="2800" dirty="0" smtClean="0">
-                <a:solidFill>
-                  <a:schemeClr val="bg1"/>
-                </a:solidFill>
-              </a:rPr>
-              <a:t>slot name</a:t>
-            </a:r>
-            <a:r>
-              <a:rPr lang="en-US" sz="2800" dirty="0" smtClean="0">
-                <a:solidFill>
-                  <a:srgbClr val="C00000"/>
-                </a:solidFill>
-              </a:rPr>
-              <a:t>} </a:t>
-            </a:r>
-            <a:r>
-              <a:rPr lang="en-US" sz="2800" dirty="0" smtClean="0">
-                <a:solidFill>
-                  <a:schemeClr val="bg1"/>
-                </a:solidFill>
-              </a:rPr>
-              <a:t>to reference which areas slide into slots. Slots are not required and you can have multiple</a:t>
-            </a:r>
-            <a:endParaRPr lang="en-US" sz="2800" dirty="0">
-              <a:solidFill>
-                <a:schemeClr val="bg1"/>
-              </a:solidFill>
-            </a:endParaRPr>
-          </a:p>
-        </p:txBody>
-      </p:sp>
       <p:pic>
         <p:nvPicPr>
-          <p:cNvPr id="3074" name="Picture 2"/>
+          <p:cNvPr id="1026" name="Picture 2"/>
           <p:cNvPicPr>
             <a:picLocks noChangeAspect="1" noChangeArrowheads="1"/>
           </p:cNvPicPr>
@@ -3603,8 +3474,8 @@
         </p:blipFill>
         <p:spPr bwMode="auto">
           <a:xfrm>
-            <a:off x="1076325" y="2895600"/>
-            <a:ext cx="6991350" cy="2009775"/>
+            <a:off x="609600" y="1295400"/>
+            <a:ext cx="8005763" cy="4852987"/>
           </a:xfrm>
           <a:prstGeom prst="rect">
             <a:avLst/>
@@ -3637,7 +3508,7 @@
     </p:spTree>
     <p:extLst>
       <p:ext uri="{BB962C8B-B14F-4D97-AF65-F5344CB8AC3E}">
-        <p14:creationId xmlns:p14="http://schemas.microsoft.com/office/powerpoint/2010/main" val="1907274843"/>
+        <p14:creationId xmlns:p14="http://schemas.microsoft.com/office/powerpoint/2010/main" val="1349819196"/>
       </p:ext>
     </p:extLst>
   </p:cSld>
@@ -3702,7 +3573,15 @@
                   <a:schemeClr val="bg1"/>
                 </a:solidFill>
               </a:rPr>
-              <a:t>Putting it together + testing!</a:t>
+              <a:t>Sample </a:t>
+            </a:r>
+            <a:r>
+              <a:rPr lang="en-US" dirty="0" err="1" smtClean="0">
+                <a:solidFill>
+                  <a:schemeClr val="bg1"/>
+                </a:solidFill>
+              </a:rPr>
+              <a:t>Occurences</a:t>
             </a:r>
             <a:endParaRPr lang="en-US" dirty="0">
               <a:solidFill>
@@ -3712,16 +3591,137 @@
           </a:p>
         </p:txBody>
       </p:sp>
+      <p:sp>
+        <p:nvSpPr>
+          <p:cNvPr id="7" name="Content Placeholder 6"/>
+          <p:cNvSpPr>
+            <a:spLocks noGrp="1"/>
+          </p:cNvSpPr>
+          <p:nvPr>
+            <p:ph idx="1"/>
+          </p:nvPr>
+        </p:nvSpPr>
+        <p:spPr/>
+        <p:txBody>
+          <a:bodyPr>
+            <a:normAutofit/>
+          </a:bodyPr>
+          <a:lstStyle/>
+          <a:p>
+            <a:pPr marL="0" indent="0" algn="ctr">
+              <a:buNone/>
+            </a:pPr>
+            <a:r>
+              <a:rPr lang="en-US" dirty="0" smtClean="0">
+                <a:solidFill>
+                  <a:schemeClr val="bg1"/>
+                </a:solidFill>
+              </a:rPr>
+              <a:t>These will map intents for your skill to sample utterance</a:t>
+            </a:r>
+          </a:p>
+          <a:p>
+            <a:pPr marL="0" indent="0" algn="ctr">
+              <a:buNone/>
+            </a:pPr>
+            <a:endParaRPr lang="en-US" dirty="0">
+              <a:solidFill>
+                <a:schemeClr val="bg1"/>
+              </a:solidFill>
+            </a:endParaRPr>
+          </a:p>
+          <a:p>
+            <a:pPr marL="0" indent="0" algn="ctr">
+              <a:buNone/>
+            </a:pPr>
+            <a:endParaRPr lang="en-US" dirty="0" smtClean="0">
+              <a:solidFill>
+                <a:schemeClr val="bg1"/>
+              </a:solidFill>
+            </a:endParaRPr>
+          </a:p>
+          <a:p>
+            <a:pPr marL="0" indent="0" algn="ctr">
+              <a:buNone/>
+            </a:pPr>
+            <a:endParaRPr lang="en-US" dirty="0">
+              <a:solidFill>
+                <a:schemeClr val="bg1"/>
+              </a:solidFill>
+            </a:endParaRPr>
+          </a:p>
+          <a:p>
+            <a:pPr marL="0" indent="0" algn="ctr">
+              <a:buNone/>
+            </a:pPr>
+            <a:endParaRPr lang="en-US" sz="2800" dirty="0" smtClean="0">
+              <a:solidFill>
+                <a:schemeClr val="bg1"/>
+              </a:solidFill>
+            </a:endParaRPr>
+          </a:p>
+          <a:p>
+            <a:pPr marL="0" indent="0" algn="ctr">
+              <a:buNone/>
+            </a:pPr>
+            <a:r>
+              <a:rPr lang="en-US" sz="2800" dirty="0" smtClean="0">
+                <a:solidFill>
+                  <a:schemeClr val="bg1"/>
+                </a:solidFill>
+              </a:rPr>
+              <a:t>Use </a:t>
+            </a:r>
+            <a:r>
+              <a:rPr lang="en-US" sz="2800" dirty="0" smtClean="0">
+                <a:solidFill>
+                  <a:srgbClr val="C00000"/>
+                </a:solidFill>
+              </a:rPr>
+              <a:t>{</a:t>
+            </a:r>
+            <a:r>
+              <a:rPr lang="en-US" sz="2800" dirty="0" smtClean="0">
+                <a:solidFill>
+                  <a:schemeClr val="bg1"/>
+                </a:solidFill>
+              </a:rPr>
+              <a:t>slot name</a:t>
+            </a:r>
+            <a:r>
+              <a:rPr lang="en-US" sz="2800" dirty="0" smtClean="0">
+                <a:solidFill>
+                  <a:srgbClr val="C00000"/>
+                </a:solidFill>
+              </a:rPr>
+              <a:t>} </a:t>
+            </a:r>
+            <a:r>
+              <a:rPr lang="en-US" sz="2800" dirty="0" smtClean="0">
+                <a:solidFill>
+                  <a:schemeClr val="bg1"/>
+                </a:solidFill>
+              </a:rPr>
+              <a:t>to reference which areas slide into slots. Slots are not required and you can have multiple</a:t>
+            </a:r>
+            <a:endParaRPr lang="en-US" sz="2800" dirty="0">
+              <a:solidFill>
+                <a:schemeClr val="bg1"/>
+              </a:solidFill>
+            </a:endParaRPr>
+          </a:p>
+        </p:txBody>
+      </p:sp>
       <p:pic>
         <p:nvPicPr>
-          <p:cNvPr id="4098" name="Picture 2"/>
+          <p:cNvPr id="3074" name="Picture 2"/>
           <p:cNvPicPr>
             <a:picLocks noChangeAspect="1" noChangeArrowheads="1"/>
           </p:cNvPicPr>
           <p:nvPr/>
         </p:nvPicPr>
         <p:blipFill>
-          <a:blip r:embed="rId2" cstate="print">
+          <a:blip r:embed="rId2">
             <a:extLst>
               <a:ext uri="{28A0092B-C50C-407E-A947-70E740481C1C}">
                 <a14:useLocalDpi xmlns:a14="http://schemas.microsoft.com/office/drawing/2010/main" val="0"/>
@@ -3735,8 +3735,8 @@
         </p:blipFill>
         <p:spPr bwMode="auto">
           <a:xfrm>
-            <a:off x="609600" y="1676400"/>
-            <a:ext cx="8216820" cy="3528672"/>
+            <a:off x="1076325" y="2895600"/>
+            <a:ext cx="6991350" cy="2009775"/>
           </a:xfrm>
           <a:prstGeom prst="rect">
             <a:avLst/>
@@ -3769,7 +3769,7 @@
     </p:spTree>
     <p:extLst>
       <p:ext uri="{BB962C8B-B14F-4D97-AF65-F5344CB8AC3E}">
-        <p14:creationId xmlns:p14="http://schemas.microsoft.com/office/powerpoint/2010/main" val="913432728"/>
+        <p14:creationId xmlns:p14="http://schemas.microsoft.com/office/powerpoint/2010/main" val="1907274843"/>
       </p:ext>
     </p:extLst>
   </p:cSld>
@@ -3834,7 +3834,7 @@
                   <a:schemeClr val="bg1"/>
                 </a:solidFill>
               </a:rPr>
-              <a:t>And if you’re using </a:t>
+              <a:t>Expanding on </a:t>
             </a:r>
             <a:r>
               <a:rPr lang="en-US" dirty="0" err="1" smtClean="0">
@@ -3842,15 +3842,7 @@
                   <a:schemeClr val="bg1"/>
                 </a:solidFill>
               </a:rPr>
-              <a:t>ngrok</a:t>
-            </a:r>
-            <a:r>
-              <a:rPr lang="en-US" dirty="0" smtClean="0">
-                <a:solidFill>
-                  <a:schemeClr val="bg1"/>
-                </a:solidFill>
-              </a:rPr>
-              <a:t>…</a:t>
+              <a:t>SimpleTexter</a:t>
             </a:r>
             <a:endParaRPr lang="en-US" dirty="0">
               <a:solidFill>
@@ -3862,7 +3854,7 @@
       </p:sp>
       <p:pic>
         <p:nvPicPr>
-          <p:cNvPr id="5122" name="Picture 2"/>
+          <p:cNvPr id="2051" name="Picture 3"/>
           <p:cNvPicPr>
             <a:picLocks noChangeAspect="1" noChangeArrowheads="1"/>
           </p:cNvPicPr>
@@ -3883,8 +3875,8 @@
         </p:blipFill>
         <p:spPr bwMode="auto">
           <a:xfrm>
-            <a:off x="685800" y="1524000"/>
-            <a:ext cx="7941891" cy="2925763"/>
+            <a:off x="1600200" y="1219200"/>
+            <a:ext cx="5943600" cy="5564222"/>
           </a:xfrm>
           <a:prstGeom prst="rect">
             <a:avLst/>
@@ -3917,7 +3909,7 @@
     </p:spTree>
     <p:extLst>
       <p:ext uri="{BB962C8B-B14F-4D97-AF65-F5344CB8AC3E}">
-        <p14:creationId xmlns:p14="http://schemas.microsoft.com/office/powerpoint/2010/main" val="3571188985"/>
+        <p14:creationId xmlns:p14="http://schemas.microsoft.com/office/powerpoint/2010/main" val="2770146145"/>
       </p:ext>
     </p:extLst>
   </p:cSld>
@@ -3982,7 +3974,7 @@
                   <a:schemeClr val="bg1"/>
                 </a:solidFill>
               </a:rPr>
-              <a:t>Then we test + play</a:t>
+              <a:t>Putting it together + testing!</a:t>
             </a:r>
             <a:endParaRPr lang="en-US" dirty="0">
               <a:solidFill>
@@ -3994,7 +3986,7 @@
       </p:sp>
       <p:pic>
         <p:nvPicPr>
-          <p:cNvPr id="6146" name="Picture 2"/>
+          <p:cNvPr id="4098" name="Picture 2"/>
           <p:cNvPicPr>
             <a:picLocks noChangeAspect="1" noChangeArrowheads="1"/>
           </p:cNvPicPr>
@@ -4015,8 +4007,8 @@
         </p:blipFill>
         <p:spPr bwMode="auto">
           <a:xfrm>
-            <a:off x="1371600" y="1371600"/>
-            <a:ext cx="6536649" cy="4802188"/>
+            <a:off x="609600" y="1676400"/>
+            <a:ext cx="8216820" cy="3528672"/>
           </a:xfrm>
           <a:prstGeom prst="rect">
             <a:avLst/>
@@ -4049,7 +4041,7 @@
     </p:spTree>
     <p:extLst>
       <p:ext uri="{BB962C8B-B14F-4D97-AF65-F5344CB8AC3E}">
-        <p14:creationId xmlns:p14="http://schemas.microsoft.com/office/powerpoint/2010/main" val="2937196038"/>
+        <p14:creationId xmlns:p14="http://schemas.microsoft.com/office/powerpoint/2010/main" val="913432728"/>
       </p:ext>
     </p:extLst>
   </p:cSld>
@@ -4114,7 +4106,23 @@
                   <a:schemeClr val="bg1"/>
                 </a:solidFill>
               </a:rPr>
-              <a:t>The Request</a:t>
+              <a:t>And if you’re using </a:t>
+            </a:r>
+            <a:r>
+              <a:rPr lang="en-US" dirty="0" err="1" smtClean="0">
+                <a:solidFill>
+                  <a:schemeClr val="bg1"/>
+                </a:solidFill>
+              </a:rPr>
+              <a:t>ngrok</a:t>
+            </a:r>
+            <a:r>
+              <a:rPr lang="en-US" dirty="0" smtClean="0">
+                <a:solidFill>
+                  <a:schemeClr val="bg1"/>
+                </a:solidFill>
+              </a:rPr>
+              <a:t>…</a:t>
             </a:r>
             <a:endParaRPr lang="en-US" dirty="0">
               <a:solidFill>
@@ -4126,14 +4134,14 @@
       </p:sp>
       <p:pic>
         <p:nvPicPr>
-          <p:cNvPr id="1027" name="Picture 3"/>
+          <p:cNvPr id="5122" name="Picture 2"/>
           <p:cNvPicPr>
             <a:picLocks noChangeAspect="1" noChangeArrowheads="1"/>
           </p:cNvPicPr>
           <p:nvPr/>
         </p:nvPicPr>
         <p:blipFill>
-          <a:blip r:embed="rId2">
+          <a:blip r:embed="rId2" cstate="print">
             <a:extLst>
               <a:ext uri="{28A0092B-C50C-407E-A947-70E740481C1C}">
                 <a14:useLocalDpi xmlns:a14="http://schemas.microsoft.com/office/drawing/2010/main" val="0"/>
@@ -4147,8 +4155,8 @@
         </p:blipFill>
         <p:spPr bwMode="auto">
           <a:xfrm>
-            <a:off x="676275" y="1571625"/>
-            <a:ext cx="7791450" cy="3714750"/>
+            <a:off x="685800" y="1524000"/>
+            <a:ext cx="7941891" cy="2925763"/>
           </a:xfrm>
           <a:prstGeom prst="rect">
             <a:avLst/>
@@ -4181,7 +4189,7 @@
     </p:spTree>
     <p:extLst>
       <p:ext uri="{BB962C8B-B14F-4D97-AF65-F5344CB8AC3E}">
-        <p14:creationId xmlns:p14="http://schemas.microsoft.com/office/powerpoint/2010/main" val="1759016485"/>
+        <p14:creationId xmlns:p14="http://schemas.microsoft.com/office/powerpoint/2010/main" val="3571188985"/>
       </p:ext>
     </p:extLst>
   </p:cSld>
@@ -4246,6 +4254,270 @@
                   <a:schemeClr val="bg1"/>
                 </a:solidFill>
               </a:rPr>
+              <a:t>Then we test + play</a:t>
+            </a:r>
+            <a:endParaRPr lang="en-US" dirty="0">
+              <a:solidFill>
+                <a:schemeClr val="bg1"/>
+              </a:solidFill>
+            </a:endParaRPr>
+          </a:p>
+        </p:txBody>
+      </p:sp>
+      <p:pic>
+        <p:nvPicPr>
+          <p:cNvPr id="6146" name="Picture 2"/>
+          <p:cNvPicPr>
+            <a:picLocks noChangeAspect="1" noChangeArrowheads="1"/>
+          </p:cNvPicPr>
+          <p:nvPr/>
+        </p:nvPicPr>
+        <p:blipFill>
+          <a:blip r:embed="rId2" cstate="print">
+            <a:extLst>
+              <a:ext uri="{28A0092B-C50C-407E-A947-70E740481C1C}">
+                <a14:useLocalDpi xmlns:a14="http://schemas.microsoft.com/office/drawing/2010/main" val="0"/>
+              </a:ext>
+            </a:extLst>
+          </a:blip>
+          <a:srcRect/>
+          <a:stretch>
+            <a:fillRect/>
+          </a:stretch>
+        </p:blipFill>
+        <p:spPr bwMode="auto">
+          <a:xfrm>
+            <a:off x="1371600" y="1371600"/>
+            <a:ext cx="6536649" cy="4802188"/>
+          </a:xfrm>
+          <a:prstGeom prst="rect">
+            <a:avLst/>
+          </a:prstGeom>
+          <a:noFill/>
+          <a:ln>
+            <a:noFill/>
+          </a:ln>
+          <a:extLst>
+            <a:ext uri="{909E8E84-426E-40DD-AFC4-6F175D3DCCD1}">
+              <a14:hiddenFill xmlns:a14="http://schemas.microsoft.com/office/drawing/2010/main">
+                <a:solidFill>
+                  <a:schemeClr val="accent1"/>
+                </a:solidFill>
+              </a14:hiddenFill>
+            </a:ext>
+            <a:ext uri="{91240B29-F687-4F45-9708-019B960494DF}">
+              <a14:hiddenLine xmlns:a14="http://schemas.microsoft.com/office/drawing/2010/main" w="9525">
+                <a:solidFill>
+                  <a:schemeClr val="tx1"/>
+                </a:solidFill>
+                <a:miter lim="800000"/>
+                <a:headEnd/>
+                <a:tailEnd/>
+              </a14:hiddenLine>
+            </a:ext>
+          </a:extLst>
+        </p:spPr>
+      </p:pic>
+    </p:spTree>
+    <p:extLst>
+      <p:ext uri="{BB962C8B-B14F-4D97-AF65-F5344CB8AC3E}">
+        <p14:creationId xmlns:p14="http://schemas.microsoft.com/office/powerpoint/2010/main" val="2937196038"/>
+      </p:ext>
+    </p:extLst>
+  </p:cSld>
+  <p:clrMapOvr>
+    <a:masterClrMapping/>
+  </p:clrMapOvr>
+  <p:timing>
+    <p:tnLst>
+      <p:par>
+        <p:cTn id="1" dur="indefinite" restart="never" nodeType="tmRoot"/>
+      </p:par>
+    </p:tnLst>
+  </p:timing>
+</p:sld>
+</file>
+
+<file path=ppt/slides/slide16.xml><?xml version="1.0" encoding="utf-8"?>
+<p:sld xmlns:a="http://schemas.openxmlformats.org/drawingml/2006/main" xmlns:r="http://schemas.openxmlformats.org/officeDocument/2006/relationships" xmlns:p="http://schemas.openxmlformats.org/presentationml/2006/main">
+  <p:cSld>
+    <p:bg>
+      <p:bgPr>
+        <a:solidFill>
+          <a:srgbClr val="333333"/>
+        </a:solidFill>
+        <a:effectLst/>
+      </p:bgPr>
+    </p:bg>
+    <p:spTree>
+      <p:nvGrpSpPr>
+        <p:cNvPr id="1" name=""/>
+        <p:cNvGrpSpPr/>
+        <p:nvPr/>
+      </p:nvGrpSpPr>
+      <p:grpSpPr>
+        <a:xfrm>
+          <a:off x="0" y="0"/>
+          <a:ext cx="0" cy="0"/>
+          <a:chOff x="0" y="0"/>
+          <a:chExt cx="0" cy="0"/>
+        </a:xfrm>
+      </p:grpSpPr>
+      <p:sp>
+        <p:nvSpPr>
+          <p:cNvPr id="2" name="Title 1"/>
+          <p:cNvSpPr>
+            <a:spLocks noGrp="1"/>
+          </p:cNvSpPr>
+          <p:nvPr>
+            <p:ph type="title"/>
+          </p:nvPr>
+        </p:nvSpPr>
+        <p:spPr/>
+        <p:txBody>
+          <a:bodyPr>
+            <a:normAutofit/>
+          </a:bodyPr>
+          <a:lstStyle/>
+          <a:p>
+            <a:r>
+              <a:rPr lang="en-US" dirty="0" smtClean="0">
+                <a:solidFill>
+                  <a:schemeClr val="bg1"/>
+                </a:solidFill>
+              </a:rPr>
+              <a:t>The Request</a:t>
+            </a:r>
+            <a:endParaRPr lang="en-US" dirty="0">
+              <a:solidFill>
+                <a:schemeClr val="bg1"/>
+              </a:solidFill>
+            </a:endParaRPr>
+          </a:p>
+        </p:txBody>
+      </p:sp>
+      <p:pic>
+        <p:nvPicPr>
+          <p:cNvPr id="1027" name="Picture 3"/>
+          <p:cNvPicPr>
+            <a:picLocks noChangeAspect="1" noChangeArrowheads="1"/>
+          </p:cNvPicPr>
+          <p:nvPr/>
+        </p:nvPicPr>
+        <p:blipFill>
+          <a:blip r:embed="rId2">
+            <a:extLst>
+              <a:ext uri="{28A0092B-C50C-407E-A947-70E740481C1C}">
+                <a14:useLocalDpi xmlns:a14="http://schemas.microsoft.com/office/drawing/2010/main" val="0"/>
+              </a:ext>
+            </a:extLst>
+          </a:blip>
+          <a:srcRect/>
+          <a:stretch>
+            <a:fillRect/>
+          </a:stretch>
+        </p:blipFill>
+        <p:spPr bwMode="auto">
+          <a:xfrm>
+            <a:off x="676275" y="1571625"/>
+            <a:ext cx="7791450" cy="3714750"/>
+          </a:xfrm>
+          <a:prstGeom prst="rect">
+            <a:avLst/>
+          </a:prstGeom>
+          <a:noFill/>
+          <a:ln>
+            <a:noFill/>
+          </a:ln>
+          <a:extLst>
+            <a:ext uri="{909E8E84-426E-40DD-AFC4-6F175D3DCCD1}">
+              <a14:hiddenFill xmlns:a14="http://schemas.microsoft.com/office/drawing/2010/main">
+                <a:solidFill>
+                  <a:schemeClr val="accent1"/>
+                </a:solidFill>
+              </a14:hiddenFill>
+            </a:ext>
+            <a:ext uri="{91240B29-F687-4F45-9708-019B960494DF}">
+              <a14:hiddenLine xmlns:a14="http://schemas.microsoft.com/office/drawing/2010/main" w="9525">
+                <a:solidFill>
+                  <a:schemeClr val="tx1"/>
+                </a:solidFill>
+                <a:miter lim="800000"/>
+                <a:headEnd/>
+                <a:tailEnd/>
+              </a14:hiddenLine>
+            </a:ext>
+          </a:extLst>
+        </p:spPr>
+      </p:pic>
+    </p:spTree>
+    <p:extLst>
+      <p:ext uri="{BB962C8B-B14F-4D97-AF65-F5344CB8AC3E}">
+        <p14:creationId xmlns:p14="http://schemas.microsoft.com/office/powerpoint/2010/main" val="1759016485"/>
+      </p:ext>
+    </p:extLst>
+  </p:cSld>
+  <p:clrMapOvr>
+    <a:masterClrMapping/>
+  </p:clrMapOvr>
+  <p:timing>
+    <p:tnLst>
+      <p:par>
+        <p:cTn id="1" dur="indefinite" restart="never" nodeType="tmRoot"/>
+      </p:par>
+    </p:tnLst>
+  </p:timing>
+</p:sld>
+</file>
+
+<file path=ppt/slides/slide17.xml><?xml version="1.0" encoding="utf-8"?>
+<p:sld xmlns:a="http://schemas.openxmlformats.org/drawingml/2006/main" xmlns:r="http://schemas.openxmlformats.org/officeDocument/2006/relationships" xmlns:p="http://schemas.openxmlformats.org/presentationml/2006/main">
+  <p:cSld>
+    <p:bg>
+      <p:bgPr>
+        <a:solidFill>
+          <a:srgbClr val="333333"/>
+        </a:solidFill>
+        <a:effectLst/>
+      </p:bgPr>
+    </p:bg>
+    <p:spTree>
+      <p:nvGrpSpPr>
+        <p:cNvPr id="1" name=""/>
+        <p:cNvGrpSpPr/>
+        <p:nvPr/>
+      </p:nvGrpSpPr>
+      <p:grpSpPr>
+        <a:xfrm>
+          <a:off x="0" y="0"/>
+          <a:ext cx="0" cy="0"/>
+          <a:chOff x="0" y="0"/>
+          <a:chExt cx="0" cy="0"/>
+        </a:xfrm>
+      </p:grpSpPr>
+      <p:sp>
+        <p:nvSpPr>
+          <p:cNvPr id="2" name="Title 1"/>
+          <p:cNvSpPr>
+            <a:spLocks noGrp="1"/>
+          </p:cNvSpPr>
+          <p:nvPr>
+            <p:ph type="title"/>
+          </p:nvPr>
+        </p:nvSpPr>
+        <p:spPr/>
+        <p:txBody>
+          <a:bodyPr>
+            <a:normAutofit/>
+          </a:bodyPr>
+          <a:lstStyle/>
+          <a:p>
+            <a:r>
+              <a:rPr lang="en-US" dirty="0" smtClean="0">
+                <a:solidFill>
+                  <a:schemeClr val="bg1"/>
+                </a:solidFill>
+              </a:rPr>
               <a:t>The Request</a:t>
             </a:r>
             <a:endParaRPr lang="en-US" dirty="0">
@@ -4711,7 +4983,7 @@
 </p:sld>
 </file>
 
-<file path=ppt/slides/slide16.xml><?xml version="1.0" encoding="utf-8"?>
+<file path=ppt/slides/slide18.xml><?xml version="1.0" encoding="utf-8"?>
 <p:sld xmlns:a="http://schemas.openxmlformats.org/drawingml/2006/main" xmlns:r="http://schemas.openxmlformats.org/officeDocument/2006/relationships" xmlns:p="http://schemas.openxmlformats.org/presentationml/2006/main">
   <p:cSld>
     <p:bg>
@@ -4973,270 +5245,6 @@
 </p:sld>
 </file>
 
-<file path=ppt/slides/slide17.xml><?xml version="1.0" encoding="utf-8"?>
-<p:sld xmlns:a="http://schemas.openxmlformats.org/drawingml/2006/main" xmlns:r="http://schemas.openxmlformats.org/officeDocument/2006/relationships" xmlns:p="http://schemas.openxmlformats.org/presentationml/2006/main">
-  <p:cSld>
-    <p:bg>
-      <p:bgPr>
-        <a:solidFill>
-          <a:srgbClr val="333333"/>
-        </a:solidFill>
-        <a:effectLst/>
-      </p:bgPr>
-    </p:bg>
-    <p:spTree>
-      <p:nvGrpSpPr>
-        <p:cNvPr id="1" name=""/>
-        <p:cNvGrpSpPr/>
-        <p:nvPr/>
-      </p:nvGrpSpPr>
-      <p:grpSpPr>
-        <a:xfrm>
-          <a:off x="0" y="0"/>
-          <a:ext cx="0" cy="0"/>
-          <a:chOff x="0" y="0"/>
-          <a:chExt cx="0" cy="0"/>
-        </a:xfrm>
-      </p:grpSpPr>
-      <p:sp>
-        <p:nvSpPr>
-          <p:cNvPr id="2" name="Title 1"/>
-          <p:cNvSpPr>
-            <a:spLocks noGrp="1"/>
-          </p:cNvSpPr>
-          <p:nvPr>
-            <p:ph type="title"/>
-          </p:nvPr>
-        </p:nvSpPr>
-        <p:spPr/>
-        <p:txBody>
-          <a:bodyPr>
-            <a:normAutofit/>
-          </a:bodyPr>
-          <a:lstStyle/>
-          <a:p>
-            <a:r>
-              <a:rPr lang="en-US" dirty="0" err="1" smtClean="0">
-                <a:solidFill>
-                  <a:schemeClr val="bg1"/>
-                </a:solidFill>
-              </a:rPr>
-              <a:t>SimpleTexter</a:t>
-            </a:r>
-            <a:endParaRPr lang="en-US" dirty="0">
-              <a:solidFill>
-                <a:schemeClr val="bg1"/>
-              </a:solidFill>
-            </a:endParaRPr>
-          </a:p>
-        </p:txBody>
-      </p:sp>
-      <p:pic>
-        <p:nvPicPr>
-          <p:cNvPr id="3" name="Picture 2"/>
-          <p:cNvPicPr>
-            <a:picLocks noChangeAspect="1" noChangeArrowheads="1"/>
-          </p:cNvPicPr>
-          <p:nvPr/>
-        </p:nvPicPr>
-        <p:blipFill>
-          <a:blip r:embed="rId2" cstate="print">
-            <a:extLst>
-              <a:ext uri="{28A0092B-C50C-407E-A947-70E740481C1C}">
-                <a14:useLocalDpi xmlns:a14="http://schemas.microsoft.com/office/drawing/2010/main" val="0"/>
-              </a:ext>
-            </a:extLst>
-          </a:blip>
-          <a:srcRect/>
-          <a:stretch>
-            <a:fillRect/>
-          </a:stretch>
-        </p:blipFill>
-        <p:spPr bwMode="auto">
-          <a:xfrm>
-            <a:off x="1447800" y="1219200"/>
-            <a:ext cx="6538913" cy="5303242"/>
-          </a:xfrm>
-          <a:prstGeom prst="rect">
-            <a:avLst/>
-          </a:prstGeom>
-          <a:noFill/>
-          <a:ln>
-            <a:noFill/>
-          </a:ln>
-          <a:extLst>
-            <a:ext uri="{909E8E84-426E-40DD-AFC4-6F175D3DCCD1}">
-              <a14:hiddenFill xmlns:a14="http://schemas.microsoft.com/office/drawing/2010/main">
-                <a:solidFill>
-                  <a:schemeClr val="accent1"/>
-                </a:solidFill>
-              </a14:hiddenFill>
-            </a:ext>
-            <a:ext uri="{91240B29-F687-4F45-9708-019B960494DF}">
-              <a14:hiddenLine xmlns:a14="http://schemas.microsoft.com/office/drawing/2010/main" w="9525">
-                <a:solidFill>
-                  <a:schemeClr val="tx1"/>
-                </a:solidFill>
-                <a:miter lim="800000"/>
-                <a:headEnd/>
-                <a:tailEnd/>
-              </a14:hiddenLine>
-            </a:ext>
-          </a:extLst>
-        </p:spPr>
-      </p:pic>
-    </p:spTree>
-    <p:extLst>
-      <p:ext uri="{BB962C8B-B14F-4D97-AF65-F5344CB8AC3E}">
-        <p14:creationId xmlns:p14="http://schemas.microsoft.com/office/powerpoint/2010/main" val="3650528965"/>
-      </p:ext>
-    </p:extLst>
-  </p:cSld>
-  <p:clrMapOvr>
-    <a:masterClrMapping/>
-  </p:clrMapOvr>
-  <p:timing>
-    <p:tnLst>
-      <p:par>
-        <p:cTn id="1" dur="indefinite" restart="never" nodeType="tmRoot"/>
-      </p:par>
-    </p:tnLst>
-  </p:timing>
-</p:sld>
-</file>
-
-<file path=ppt/slides/slide18.xml><?xml version="1.0" encoding="utf-8"?>
-<p:sld xmlns:a="http://schemas.openxmlformats.org/drawingml/2006/main" xmlns:r="http://schemas.openxmlformats.org/officeDocument/2006/relationships" xmlns:p="http://schemas.openxmlformats.org/presentationml/2006/main">
-  <p:cSld>
-    <p:bg>
-      <p:bgPr>
-        <a:solidFill>
-          <a:srgbClr val="333333"/>
-        </a:solidFill>
-        <a:effectLst/>
-      </p:bgPr>
-    </p:bg>
-    <p:spTree>
-      <p:nvGrpSpPr>
-        <p:cNvPr id="1" name=""/>
-        <p:cNvGrpSpPr/>
-        <p:nvPr/>
-      </p:nvGrpSpPr>
-      <p:grpSpPr>
-        <a:xfrm>
-          <a:off x="0" y="0"/>
-          <a:ext cx="0" cy="0"/>
-          <a:chOff x="0" y="0"/>
-          <a:chExt cx="0" cy="0"/>
-        </a:xfrm>
-      </p:grpSpPr>
-      <p:sp>
-        <p:nvSpPr>
-          <p:cNvPr id="2" name="Title 1"/>
-          <p:cNvSpPr>
-            <a:spLocks noGrp="1"/>
-          </p:cNvSpPr>
-          <p:nvPr>
-            <p:ph type="title"/>
-          </p:nvPr>
-        </p:nvSpPr>
-        <p:spPr/>
-        <p:txBody>
-          <a:bodyPr>
-            <a:normAutofit/>
-          </a:bodyPr>
-          <a:lstStyle/>
-          <a:p>
-            <a:r>
-              <a:rPr lang="en-US" dirty="0" smtClean="0">
-                <a:solidFill>
-                  <a:schemeClr val="bg1"/>
-                </a:solidFill>
-              </a:rPr>
-              <a:t>Making a custom slot</a:t>
-            </a:r>
-            <a:endParaRPr lang="en-US" dirty="0">
-              <a:solidFill>
-                <a:schemeClr val="bg1"/>
-              </a:solidFill>
-            </a:endParaRPr>
-          </a:p>
-        </p:txBody>
-      </p:sp>
-      <p:pic>
-        <p:nvPicPr>
-          <p:cNvPr id="1026" name="Picture 2"/>
-          <p:cNvPicPr>
-            <a:picLocks noChangeAspect="1" noChangeArrowheads="1"/>
-          </p:cNvPicPr>
-          <p:nvPr/>
-        </p:nvPicPr>
-        <p:blipFill>
-          <a:blip r:embed="rId2">
-            <a:extLst>
-              <a:ext uri="{28A0092B-C50C-407E-A947-70E740481C1C}">
-                <a14:useLocalDpi xmlns:a14="http://schemas.microsoft.com/office/drawing/2010/main" val="0"/>
-              </a:ext>
-            </a:extLst>
-          </a:blip>
-          <a:srcRect/>
-          <a:stretch>
-            <a:fillRect/>
-          </a:stretch>
-        </p:blipFill>
-        <p:spPr bwMode="auto">
-          <a:xfrm>
-            <a:off x="609600" y="1295400"/>
-            <a:ext cx="8005763" cy="4852987"/>
-          </a:xfrm>
-          <a:prstGeom prst="rect">
-            <a:avLst/>
-          </a:prstGeom>
-          <a:noFill/>
-          <a:ln>
-            <a:noFill/>
-          </a:ln>
-          <a:extLst>
-            <a:ext uri="{909E8E84-426E-40DD-AFC4-6F175D3DCCD1}">
-              <a14:hiddenFill xmlns:a14="http://schemas.microsoft.com/office/drawing/2010/main">
-                <a:solidFill>
-                  <a:schemeClr val="accent1"/>
-                </a:solidFill>
-              </a14:hiddenFill>
-            </a:ext>
-            <a:ext uri="{91240B29-F687-4F45-9708-019B960494DF}">
-              <a14:hiddenLine xmlns:a14="http://schemas.microsoft.com/office/drawing/2010/main" w="9525">
-                <a:solidFill>
-                  <a:schemeClr val="tx1"/>
-                </a:solidFill>
-                <a:miter lim="800000"/>
-                <a:headEnd/>
-                <a:tailEnd/>
-              </a14:hiddenLine>
-            </a:ext>
-          </a:extLst>
-        </p:spPr>
-      </p:pic>
-    </p:spTree>
-    <p:extLst>
-      <p:ext uri="{BB962C8B-B14F-4D97-AF65-F5344CB8AC3E}">
-        <p14:creationId xmlns:p14="http://schemas.microsoft.com/office/powerpoint/2010/main" val="1349819196"/>
-      </p:ext>
-    </p:extLst>
-  </p:cSld>
-  <p:clrMapOvr>
-    <a:masterClrMapping/>
-  </p:clrMapOvr>
-  <p:timing>
-    <p:tnLst>
-      <p:par>
-        <p:cTn id="1" dur="indefinite" restart="never" nodeType="tmRoot"/>
-      </p:par>
-    </p:tnLst>
-  </p:timing>
-</p:sld>
-</file>
-
 <file path=ppt/slides/slide19.xml><?xml version="1.0" encoding="utf-8"?>
 <p:sld xmlns:a="http://schemas.openxmlformats.org/drawingml/2006/main" xmlns:r="http://schemas.openxmlformats.org/officeDocument/2006/relationships" xmlns:p="http://schemas.openxmlformats.org/presentationml/2006/main">
   <p:cSld>
@@ -5280,20 +5288,12 @@
           <a:lstStyle/>
           <a:p>
             <a:r>
-              <a:rPr lang="en-US" dirty="0" smtClean="0">
+              <a:rPr lang="en-US" dirty="0" err="1" smtClean="0">
                 <a:solidFill>
                   <a:schemeClr val="bg1"/>
                 </a:solidFill>
               </a:rPr>
-              <a:t>Expanding on simple </a:t>
-            </a:r>
-            <a:r>
-              <a:rPr lang="en-US" dirty="0" err="1" smtClean="0">
-                <a:solidFill>
-                  <a:schemeClr val="bg1"/>
-                </a:solidFill>
-              </a:rPr>
-              <a:t>texter</a:t>
+              <a:t>SimpleTexter</a:t>
             </a:r>
             <a:endParaRPr lang="en-US" dirty="0">
               <a:solidFill>
@@ -5305,7 +5305,7 @@
       </p:sp>
       <p:pic>
         <p:nvPicPr>
-          <p:cNvPr id="2051" name="Picture 3"/>
+          <p:cNvPr id="4100" name="Picture 4"/>
           <p:cNvPicPr>
             <a:picLocks noChangeAspect="1" noChangeArrowheads="1"/>
           </p:cNvPicPr>
@@ -5326,8 +5326,8 @@
         </p:blipFill>
         <p:spPr bwMode="auto">
           <a:xfrm>
-            <a:off x="1600200" y="1219200"/>
-            <a:ext cx="5943600" cy="5564222"/>
+            <a:off x="762000" y="1219200"/>
+            <a:ext cx="7898892" cy="5410200"/>
           </a:xfrm>
           <a:prstGeom prst="rect">
             <a:avLst/>
@@ -5360,7 +5360,7 @@
     </p:spTree>
     <p:extLst>
       <p:ext uri="{BB962C8B-B14F-4D97-AF65-F5344CB8AC3E}">
-        <p14:creationId xmlns:p14="http://schemas.microsoft.com/office/powerpoint/2010/main" val="2770146145"/>
+        <p14:creationId xmlns:p14="http://schemas.microsoft.com/office/powerpoint/2010/main" val="2372961381"/>
       </p:ext>
     </p:extLst>
   </p:cSld>
@@ -5763,15 +5763,7 @@
                   <a:schemeClr val="bg1"/>
                 </a:solidFill>
               </a:rPr>
-              <a:t>Advanced </a:t>
-            </a:r>
-            <a:r>
-              <a:rPr lang="en-US" dirty="0" err="1" smtClean="0">
-                <a:solidFill>
-                  <a:schemeClr val="bg1"/>
-                </a:solidFill>
-              </a:rPr>
-              <a:t>Texter</a:t>
+              <a:t>Finale</a:t>
             </a:r>
             <a:endParaRPr lang="en-US" dirty="0">
               <a:solidFill>
@@ -5781,64 +5773,48 @@
           </a:p>
         </p:txBody>
       </p:sp>
-      <p:pic>
-        <p:nvPicPr>
-          <p:cNvPr id="4100" name="Picture 4"/>
-          <p:cNvPicPr>
-            <a:picLocks noChangeAspect="1" noChangeArrowheads="1"/>
-          </p:cNvPicPr>
+      <p:sp>
+        <p:nvSpPr>
+          <p:cNvPr id="3" name="TextBox 2"/>
+          <p:cNvSpPr txBox="1"/>
           <p:nvPr/>
-        </p:nvPicPr>
-        <p:blipFill>
-          <a:blip r:embed="rId2" cstate="print">
-            <a:extLst>
-              <a:ext uri="{28A0092B-C50C-407E-A947-70E740481C1C}">
-                <a14:useLocalDpi xmlns:a14="http://schemas.microsoft.com/office/drawing/2010/main" val="0"/>
-              </a:ext>
-            </a:extLst>
-          </a:blip>
-          <a:srcRect/>
-          <a:stretch>
-            <a:fillRect/>
-          </a:stretch>
-        </p:blipFill>
-        <p:spPr bwMode="auto">
+        </p:nvSpPr>
+        <p:spPr>
           <a:xfrm>
-            <a:off x="762000" y="1219200"/>
-            <a:ext cx="7898892" cy="5410200"/>
+            <a:off x="3429000" y="3124200"/>
+            <a:ext cx="2323072" cy="369332"/>
           </a:xfrm>
           <a:prstGeom prst="rect">
             <a:avLst/>
           </a:prstGeom>
           <a:noFill/>
-          <a:ln>
-            <a:noFill/>
-          </a:ln>
-          <a:extLst>
-            <a:ext uri="{909E8E84-426E-40DD-AFC4-6F175D3DCCD1}">
-              <a14:hiddenFill xmlns:a14="http://schemas.microsoft.com/office/drawing/2010/main">
-                <a:solidFill>
-                  <a:schemeClr val="accent1"/>
-                </a:solidFill>
-              </a14:hiddenFill>
-            </a:ext>
-            <a:ext uri="{91240B29-F687-4F45-9708-019B960494DF}">
-              <a14:hiddenLine xmlns:a14="http://schemas.microsoft.com/office/drawing/2010/main" w="9525">
-                <a:solidFill>
-                  <a:schemeClr val="tx1"/>
-                </a:solidFill>
-                <a:miter lim="800000"/>
-                <a:headEnd/>
-                <a:tailEnd/>
-              </a14:hiddenLine>
-            </a:ext>
-          </a:extLst>
         </p:spPr>
-      </p:pic>
+        <p:txBody>
+          <a:bodyPr wrap="none" rtlCol="0">
+            <a:spAutoFit/>
+          </a:bodyPr>
+          <a:lstStyle/>
+          <a:p>
+            <a:r>
+              <a:rPr lang="en-US" dirty="0" smtClean="0">
+                <a:solidFill>
+                  <a:schemeClr val="bg1"/>
+                </a:solidFill>
+              </a:rPr>
+              <a:t>You awaken in a field…</a:t>
+            </a:r>
+            <a:endParaRPr lang="en-US" dirty="0">
+              <a:solidFill>
+                <a:schemeClr val="bg1"/>
+              </a:solidFill>
+            </a:endParaRPr>
+          </a:p>
+        </p:txBody>
+      </p:sp>
     </p:spTree>
     <p:extLst>
       <p:ext uri="{BB962C8B-B14F-4D97-AF65-F5344CB8AC3E}">
-        <p14:creationId xmlns:p14="http://schemas.microsoft.com/office/powerpoint/2010/main" val="2372961381"/>
+        <p14:creationId xmlns:p14="http://schemas.microsoft.com/office/powerpoint/2010/main" val="1639287598"/>
       </p:ext>
     </p:extLst>
   </p:cSld>
@@ -6227,6 +6203,34 @@
                 </a:solidFill>
               </a:rPr>
               <a:t>“Dim the lights”</a:t>
+            </a:r>
+          </a:p>
+          <a:p>
+            <a:endParaRPr lang="en-US" dirty="0">
+              <a:solidFill>
+                <a:schemeClr val="bg1"/>
+              </a:solidFill>
+            </a:endParaRPr>
+          </a:p>
+          <a:p>
+            <a:pPr marL="0" indent="0" algn="ctr">
+              <a:buNone/>
+            </a:pPr>
+            <a:r>
+              <a:rPr lang="en-US" dirty="0" smtClean="0">
+                <a:solidFill>
+                  <a:srgbClr val="FF0000"/>
+                </a:solidFill>
+              </a:rPr>
+              <a:t>Coming in a future </a:t>
+            </a:r>
+            <a:r>
+              <a:rPr lang="en-US" dirty="0" smtClean="0">
+                <a:solidFill>
+                  <a:srgbClr val="FF0000"/>
+                </a:solidFill>
+              </a:rPr>
+              <a:t>talk</a:t>
             </a:r>
           </a:p>
         </p:txBody>

</xml_diff>

<commit_message>
fix: finished presentation, moved SimpleAdventure to its own repos
</commit_message>
<xml_diff>
--- a/My Robot Friend - Alexa.js.pptx
+++ b/My Robot Friend - Alexa.js.pptx
@@ -22,9 +22,10 @@
     <p:sldId id="270" r:id="rId16"/>
     <p:sldId id="267" r:id="rId17"/>
     <p:sldId id="271" r:id="rId18"/>
-    <p:sldId id="272" r:id="rId19"/>
-    <p:sldId id="275" r:id="rId20"/>
-    <p:sldId id="276" r:id="rId21"/>
+    <p:sldId id="277" r:id="rId19"/>
+    <p:sldId id="272" r:id="rId20"/>
+    <p:sldId id="275" r:id="rId21"/>
+    <p:sldId id="276" r:id="rId22"/>
   </p:sldIdLst>
   <p:sldSz cx="9144000" cy="6858000" type="screen4x3"/>
   <p:notesSz cx="6858000" cy="9144000"/>
@@ -5031,6 +5032,289 @@
                   <a:schemeClr val="bg1"/>
                 </a:solidFill>
               </a:rPr>
+              <a:t>Types of Intents</a:t>
+            </a:r>
+            <a:endParaRPr lang="en-US" dirty="0">
+              <a:solidFill>
+                <a:schemeClr val="bg1"/>
+              </a:solidFill>
+            </a:endParaRPr>
+          </a:p>
+        </p:txBody>
+      </p:sp>
+      <p:sp>
+        <p:nvSpPr>
+          <p:cNvPr id="3" name="Content Placeholder 2"/>
+          <p:cNvSpPr>
+            <a:spLocks noGrp="1"/>
+          </p:cNvSpPr>
+          <p:nvPr>
+            <p:ph idx="1"/>
+          </p:nvPr>
+        </p:nvSpPr>
+        <p:spPr/>
+        <p:txBody>
+          <a:bodyPr/>
+          <a:lstStyle/>
+          <a:p>
+            <a:r>
+              <a:rPr lang="en-US" dirty="0" err="1" smtClean="0">
+                <a:solidFill>
+                  <a:schemeClr val="bg1"/>
+                </a:solidFill>
+              </a:rPr>
+              <a:t>LaunchRequest</a:t>
+            </a:r>
+            <a:r>
+              <a:rPr lang="en-US" dirty="0" smtClean="0">
+                <a:solidFill>
+                  <a:schemeClr val="bg1"/>
+                </a:solidFill>
+              </a:rPr>
+              <a:t> </a:t>
+            </a:r>
+            <a:r>
+              <a:rPr lang="en-US" sz="2000" dirty="0" smtClean="0">
+                <a:solidFill>
+                  <a:schemeClr val="accent1">
+                    <a:lumMod val="40000"/>
+                    <a:lumOff val="60000"/>
+                  </a:schemeClr>
+                </a:solidFill>
+              </a:rPr>
+              <a:t>“Launch APP” aka no intents, no slots</a:t>
+            </a:r>
+            <a:endParaRPr lang="en-US" dirty="0" smtClean="0">
+              <a:solidFill>
+                <a:schemeClr val="bg1"/>
+              </a:solidFill>
+            </a:endParaRPr>
+          </a:p>
+          <a:p>
+            <a:endParaRPr lang="en-US" dirty="0" smtClean="0">
+              <a:solidFill>
+                <a:schemeClr val="bg1"/>
+              </a:solidFill>
+            </a:endParaRPr>
+          </a:p>
+          <a:p>
+            <a:r>
+              <a:rPr lang="en-US" dirty="0" err="1" smtClean="0">
+                <a:solidFill>
+                  <a:schemeClr val="bg1"/>
+                </a:solidFill>
+              </a:rPr>
+              <a:t>IntentRequest</a:t>
+            </a:r>
+            <a:r>
+              <a:rPr lang="en-US" dirty="0" smtClean="0">
+                <a:solidFill>
+                  <a:schemeClr val="bg1"/>
+                </a:solidFill>
+              </a:rPr>
+              <a:t> </a:t>
+            </a:r>
+            <a:r>
+              <a:rPr lang="en-US" sz="2000" dirty="0" smtClean="0">
+                <a:solidFill>
+                  <a:srgbClr val="C00000"/>
+                </a:solidFill>
+              </a:rPr>
+              <a:t>&lt;-</a:t>
+            </a:r>
+            <a:r>
+              <a:rPr lang="en-US" sz="2000" dirty="0" smtClean="0">
+                <a:solidFill>
+                  <a:schemeClr val="bg1"/>
+                </a:solidFill>
+              </a:rPr>
+              <a:t> </a:t>
+            </a:r>
+            <a:r>
+              <a:rPr lang="en-US" sz="2000" dirty="0" smtClean="0">
+                <a:solidFill>
+                  <a:schemeClr val="accent1">
+                    <a:lumMod val="40000"/>
+                    <a:lumOff val="60000"/>
+                  </a:schemeClr>
+                </a:solidFill>
+              </a:rPr>
+              <a:t>We’ve been working with this one</a:t>
+            </a:r>
+          </a:p>
+          <a:p>
+            <a:endParaRPr lang="en-US" dirty="0" smtClean="0">
+              <a:solidFill>
+                <a:schemeClr val="bg1"/>
+              </a:solidFill>
+            </a:endParaRPr>
+          </a:p>
+          <a:p>
+            <a:r>
+              <a:rPr lang="en-US" dirty="0" err="1" smtClean="0">
+                <a:solidFill>
+                  <a:schemeClr val="bg1"/>
+                </a:solidFill>
+              </a:rPr>
+              <a:t>SessionEndedRequest</a:t>
+            </a:r>
+            <a:r>
+              <a:rPr lang="en-US" dirty="0" smtClean="0">
+                <a:solidFill>
+                  <a:schemeClr val="bg1"/>
+                </a:solidFill>
+              </a:rPr>
+              <a:t> </a:t>
+            </a:r>
+            <a:r>
+              <a:rPr lang="en-US" sz="2000" dirty="0" smtClean="0">
+                <a:solidFill>
+                  <a:schemeClr val="accent1">
+                    <a:lumMod val="40000"/>
+                    <a:lumOff val="60000"/>
+                  </a:schemeClr>
+                </a:solidFill>
+              </a:rPr>
+              <a:t>“Exit” or “Stop” or no response</a:t>
+            </a:r>
+            <a:endParaRPr lang="en-US" sz="2000" dirty="0">
+              <a:solidFill>
+                <a:schemeClr val="bg1"/>
+              </a:solidFill>
+            </a:endParaRPr>
+          </a:p>
+        </p:txBody>
+      </p:sp>
+      <p:sp>
+        <p:nvSpPr>
+          <p:cNvPr id="4" name="TextBox 3"/>
+          <p:cNvSpPr txBox="1"/>
+          <p:nvPr/>
+        </p:nvSpPr>
+        <p:spPr>
+          <a:xfrm>
+            <a:off x="1295400" y="5345668"/>
+            <a:ext cx="6767302" cy="369332"/>
+          </a:xfrm>
+          <a:prstGeom prst="rect">
+            <a:avLst/>
+          </a:prstGeom>
+          <a:noFill/>
+        </p:spPr>
+        <p:txBody>
+          <a:bodyPr wrap="none" rtlCol="0">
+            <a:spAutoFit/>
+          </a:bodyPr>
+          <a:lstStyle/>
+          <a:p>
+            <a:r>
+              <a:rPr lang="en-US" dirty="0" smtClean="0">
+                <a:solidFill>
+                  <a:schemeClr val="bg1"/>
+                </a:solidFill>
+              </a:rPr>
+              <a:t>Sessions can be started in either a </a:t>
+            </a:r>
+            <a:r>
+              <a:rPr lang="en-US" dirty="0" err="1" smtClean="0">
+                <a:solidFill>
+                  <a:schemeClr val="bg1"/>
+                </a:solidFill>
+              </a:rPr>
+              <a:t>LaunchRequest</a:t>
+            </a:r>
+            <a:r>
+              <a:rPr lang="en-US" dirty="0" smtClean="0">
+                <a:solidFill>
+                  <a:schemeClr val="bg1"/>
+                </a:solidFill>
+              </a:rPr>
+              <a:t> or an </a:t>
+            </a:r>
+            <a:r>
+              <a:rPr lang="en-US" dirty="0" err="1" smtClean="0">
+                <a:solidFill>
+                  <a:schemeClr val="bg1"/>
+                </a:solidFill>
+              </a:rPr>
+              <a:t>IntentRequest</a:t>
+            </a:r>
+            <a:endParaRPr lang="en-US" dirty="0">
+              <a:solidFill>
+                <a:schemeClr val="bg1"/>
+              </a:solidFill>
+            </a:endParaRPr>
+          </a:p>
+        </p:txBody>
+      </p:sp>
+    </p:spTree>
+    <p:extLst>
+      <p:ext uri="{BB962C8B-B14F-4D97-AF65-F5344CB8AC3E}">
+        <p14:creationId xmlns:p14="http://schemas.microsoft.com/office/powerpoint/2010/main" val="1711959054"/>
+      </p:ext>
+    </p:extLst>
+  </p:cSld>
+  <p:clrMapOvr>
+    <a:masterClrMapping/>
+  </p:clrMapOvr>
+  <p:timing>
+    <p:tnLst>
+      <p:par>
+        <p:cTn id="1" dur="indefinite" restart="never" nodeType="tmRoot"/>
+      </p:par>
+    </p:tnLst>
+  </p:timing>
+</p:sld>
+</file>
+
+<file path=ppt/slides/slide19.xml><?xml version="1.0" encoding="utf-8"?>
+<p:sld xmlns:a="http://schemas.openxmlformats.org/drawingml/2006/main" xmlns:r="http://schemas.openxmlformats.org/officeDocument/2006/relationships" xmlns:p="http://schemas.openxmlformats.org/presentationml/2006/main">
+  <p:cSld>
+    <p:bg>
+      <p:bgPr>
+        <a:solidFill>
+          <a:srgbClr val="333333"/>
+        </a:solidFill>
+        <a:effectLst/>
+      </p:bgPr>
+    </p:bg>
+    <p:spTree>
+      <p:nvGrpSpPr>
+        <p:cNvPr id="1" name=""/>
+        <p:cNvGrpSpPr/>
+        <p:nvPr/>
+      </p:nvGrpSpPr>
+      <p:grpSpPr>
+        <a:xfrm>
+          <a:off x="0" y="0"/>
+          <a:ext cx="0" cy="0"/>
+          <a:chOff x="0" y="0"/>
+          <a:chExt cx="0" cy="0"/>
+        </a:xfrm>
+      </p:grpSpPr>
+      <p:sp>
+        <p:nvSpPr>
+          <p:cNvPr id="2" name="Title 1"/>
+          <p:cNvSpPr>
+            <a:spLocks noGrp="1"/>
+          </p:cNvSpPr>
+          <p:nvPr>
+            <p:ph type="title"/>
+          </p:nvPr>
+        </p:nvSpPr>
+        <p:spPr/>
+        <p:txBody>
+          <a:bodyPr>
+            <a:normAutofit/>
+          </a:bodyPr>
+          <a:lstStyle/>
+          <a:p>
+            <a:r>
+              <a:rPr lang="en-US" dirty="0" smtClean="0">
+                <a:solidFill>
+                  <a:schemeClr val="bg1"/>
+                </a:solidFill>
+              </a:rPr>
               <a:t>Expected response</a:t>
             </a:r>
             <a:endParaRPr lang="en-US" dirty="0">
@@ -5245,138 +5529,6 @@
 </p:sld>
 </file>
 
-<file path=ppt/slides/slide19.xml><?xml version="1.0" encoding="utf-8"?>
-<p:sld xmlns:a="http://schemas.openxmlformats.org/drawingml/2006/main" xmlns:r="http://schemas.openxmlformats.org/officeDocument/2006/relationships" xmlns:p="http://schemas.openxmlformats.org/presentationml/2006/main">
-  <p:cSld>
-    <p:bg>
-      <p:bgPr>
-        <a:solidFill>
-          <a:srgbClr val="333333"/>
-        </a:solidFill>
-        <a:effectLst/>
-      </p:bgPr>
-    </p:bg>
-    <p:spTree>
-      <p:nvGrpSpPr>
-        <p:cNvPr id="1" name=""/>
-        <p:cNvGrpSpPr/>
-        <p:nvPr/>
-      </p:nvGrpSpPr>
-      <p:grpSpPr>
-        <a:xfrm>
-          <a:off x="0" y="0"/>
-          <a:ext cx="0" cy="0"/>
-          <a:chOff x="0" y="0"/>
-          <a:chExt cx="0" cy="0"/>
-        </a:xfrm>
-      </p:grpSpPr>
-      <p:sp>
-        <p:nvSpPr>
-          <p:cNvPr id="2" name="Title 1"/>
-          <p:cNvSpPr>
-            <a:spLocks noGrp="1"/>
-          </p:cNvSpPr>
-          <p:nvPr>
-            <p:ph type="title"/>
-          </p:nvPr>
-        </p:nvSpPr>
-        <p:spPr/>
-        <p:txBody>
-          <a:bodyPr>
-            <a:normAutofit/>
-          </a:bodyPr>
-          <a:lstStyle/>
-          <a:p>
-            <a:r>
-              <a:rPr lang="en-US" dirty="0" err="1" smtClean="0">
-                <a:solidFill>
-                  <a:schemeClr val="bg1"/>
-                </a:solidFill>
-              </a:rPr>
-              <a:t>SimpleTexter</a:t>
-            </a:r>
-            <a:endParaRPr lang="en-US" dirty="0">
-              <a:solidFill>
-                <a:schemeClr val="bg1"/>
-              </a:solidFill>
-            </a:endParaRPr>
-          </a:p>
-        </p:txBody>
-      </p:sp>
-      <p:pic>
-        <p:nvPicPr>
-          <p:cNvPr id="4100" name="Picture 4"/>
-          <p:cNvPicPr>
-            <a:picLocks noChangeAspect="1" noChangeArrowheads="1"/>
-          </p:cNvPicPr>
-          <p:nvPr/>
-        </p:nvPicPr>
-        <p:blipFill>
-          <a:blip r:embed="rId2" cstate="print">
-            <a:extLst>
-              <a:ext uri="{28A0092B-C50C-407E-A947-70E740481C1C}">
-                <a14:useLocalDpi xmlns:a14="http://schemas.microsoft.com/office/drawing/2010/main" val="0"/>
-              </a:ext>
-            </a:extLst>
-          </a:blip>
-          <a:srcRect/>
-          <a:stretch>
-            <a:fillRect/>
-          </a:stretch>
-        </p:blipFill>
-        <p:spPr bwMode="auto">
-          <a:xfrm>
-            <a:off x="762000" y="1219200"/>
-            <a:ext cx="7898892" cy="5410200"/>
-          </a:xfrm>
-          <a:prstGeom prst="rect">
-            <a:avLst/>
-          </a:prstGeom>
-          <a:noFill/>
-          <a:ln>
-            <a:noFill/>
-          </a:ln>
-          <a:extLst>
-            <a:ext uri="{909E8E84-426E-40DD-AFC4-6F175D3DCCD1}">
-              <a14:hiddenFill xmlns:a14="http://schemas.microsoft.com/office/drawing/2010/main">
-                <a:solidFill>
-                  <a:schemeClr val="accent1"/>
-                </a:solidFill>
-              </a14:hiddenFill>
-            </a:ext>
-            <a:ext uri="{91240B29-F687-4F45-9708-019B960494DF}">
-              <a14:hiddenLine xmlns:a14="http://schemas.microsoft.com/office/drawing/2010/main" w="9525">
-                <a:solidFill>
-                  <a:schemeClr val="tx1"/>
-                </a:solidFill>
-                <a:miter lim="800000"/>
-                <a:headEnd/>
-                <a:tailEnd/>
-              </a14:hiddenLine>
-            </a:ext>
-          </a:extLst>
-        </p:spPr>
-      </p:pic>
-    </p:spTree>
-    <p:extLst>
-      <p:ext uri="{BB962C8B-B14F-4D97-AF65-F5344CB8AC3E}">
-        <p14:creationId xmlns:p14="http://schemas.microsoft.com/office/powerpoint/2010/main" val="2372961381"/>
-      </p:ext>
-    </p:extLst>
-  </p:cSld>
-  <p:clrMapOvr>
-    <a:masterClrMapping/>
-  </p:clrMapOvr>
-  <p:timing>
-    <p:tnLst>
-      <p:par>
-        <p:cTn id="1" dur="indefinite" restart="never" nodeType="tmRoot"/>
-      </p:par>
-    </p:tnLst>
-  </p:timing>
-</p:sld>
-</file>
-
 <file path=ppt/slides/slide2.xml><?xml version="1.0" encoding="utf-8"?>
 <p:sld xmlns:a="http://schemas.openxmlformats.org/drawingml/2006/main" xmlns:r="http://schemas.openxmlformats.org/officeDocument/2006/relationships" xmlns:p="http://schemas.openxmlformats.org/presentationml/2006/main">
   <p:cSld>
@@ -5716,6 +5868,138 @@
 </file>
 
 <file path=ppt/slides/slide20.xml><?xml version="1.0" encoding="utf-8"?>
+<p:sld xmlns:a="http://schemas.openxmlformats.org/drawingml/2006/main" xmlns:r="http://schemas.openxmlformats.org/officeDocument/2006/relationships" xmlns:p="http://schemas.openxmlformats.org/presentationml/2006/main">
+  <p:cSld>
+    <p:bg>
+      <p:bgPr>
+        <a:solidFill>
+          <a:srgbClr val="333333"/>
+        </a:solidFill>
+        <a:effectLst/>
+      </p:bgPr>
+    </p:bg>
+    <p:spTree>
+      <p:nvGrpSpPr>
+        <p:cNvPr id="1" name=""/>
+        <p:cNvGrpSpPr/>
+        <p:nvPr/>
+      </p:nvGrpSpPr>
+      <p:grpSpPr>
+        <a:xfrm>
+          <a:off x="0" y="0"/>
+          <a:ext cx="0" cy="0"/>
+          <a:chOff x="0" y="0"/>
+          <a:chExt cx="0" cy="0"/>
+        </a:xfrm>
+      </p:grpSpPr>
+      <p:sp>
+        <p:nvSpPr>
+          <p:cNvPr id="2" name="Title 1"/>
+          <p:cNvSpPr>
+            <a:spLocks noGrp="1"/>
+          </p:cNvSpPr>
+          <p:nvPr>
+            <p:ph type="title"/>
+          </p:nvPr>
+        </p:nvSpPr>
+        <p:spPr/>
+        <p:txBody>
+          <a:bodyPr>
+            <a:normAutofit/>
+          </a:bodyPr>
+          <a:lstStyle/>
+          <a:p>
+            <a:r>
+              <a:rPr lang="en-US" dirty="0" err="1" smtClean="0">
+                <a:solidFill>
+                  <a:schemeClr val="bg1"/>
+                </a:solidFill>
+              </a:rPr>
+              <a:t>SimpleTexter</a:t>
+            </a:r>
+            <a:endParaRPr lang="en-US" dirty="0">
+              <a:solidFill>
+                <a:schemeClr val="bg1"/>
+              </a:solidFill>
+            </a:endParaRPr>
+          </a:p>
+        </p:txBody>
+      </p:sp>
+      <p:pic>
+        <p:nvPicPr>
+          <p:cNvPr id="4100" name="Picture 4"/>
+          <p:cNvPicPr>
+            <a:picLocks noChangeAspect="1" noChangeArrowheads="1"/>
+          </p:cNvPicPr>
+          <p:nvPr/>
+        </p:nvPicPr>
+        <p:blipFill>
+          <a:blip r:embed="rId2" cstate="print">
+            <a:extLst>
+              <a:ext uri="{28A0092B-C50C-407E-A947-70E740481C1C}">
+                <a14:useLocalDpi xmlns:a14="http://schemas.microsoft.com/office/drawing/2010/main" val="0"/>
+              </a:ext>
+            </a:extLst>
+          </a:blip>
+          <a:srcRect/>
+          <a:stretch>
+            <a:fillRect/>
+          </a:stretch>
+        </p:blipFill>
+        <p:spPr bwMode="auto">
+          <a:xfrm>
+            <a:off x="762000" y="1219200"/>
+            <a:ext cx="7898892" cy="5410200"/>
+          </a:xfrm>
+          <a:prstGeom prst="rect">
+            <a:avLst/>
+          </a:prstGeom>
+          <a:noFill/>
+          <a:ln>
+            <a:noFill/>
+          </a:ln>
+          <a:extLst>
+            <a:ext uri="{909E8E84-426E-40DD-AFC4-6F175D3DCCD1}">
+              <a14:hiddenFill xmlns:a14="http://schemas.microsoft.com/office/drawing/2010/main">
+                <a:solidFill>
+                  <a:schemeClr val="accent1"/>
+                </a:solidFill>
+              </a14:hiddenFill>
+            </a:ext>
+            <a:ext uri="{91240B29-F687-4F45-9708-019B960494DF}">
+              <a14:hiddenLine xmlns:a14="http://schemas.microsoft.com/office/drawing/2010/main" w="9525">
+                <a:solidFill>
+                  <a:schemeClr val="tx1"/>
+                </a:solidFill>
+                <a:miter lim="800000"/>
+                <a:headEnd/>
+                <a:tailEnd/>
+              </a14:hiddenLine>
+            </a:ext>
+          </a:extLst>
+        </p:spPr>
+      </p:pic>
+    </p:spTree>
+    <p:extLst>
+      <p:ext uri="{BB962C8B-B14F-4D97-AF65-F5344CB8AC3E}">
+        <p14:creationId xmlns:p14="http://schemas.microsoft.com/office/powerpoint/2010/main" val="2372961381"/>
+      </p:ext>
+    </p:extLst>
+  </p:cSld>
+  <p:clrMapOvr>
+    <a:masterClrMapping/>
+  </p:clrMapOvr>
+  <p:timing>
+    <p:tnLst>
+      <p:par>
+        <p:cTn id="1" dur="indefinite" restart="never" nodeType="tmRoot"/>
+      </p:par>
+    </p:tnLst>
+  </p:timing>
+</p:sld>
+</file>
+
+<file path=ppt/slides/slide21.xml><?xml version="1.0" encoding="utf-8"?>
 <p:sld xmlns:a="http://schemas.openxmlformats.org/drawingml/2006/main" xmlns:r="http://schemas.openxmlformats.org/officeDocument/2006/relationships" xmlns:p="http://schemas.openxmlformats.org/presentationml/2006/main">
   <p:cSld>
     <p:bg>

</xml_diff>

<commit_message>
fix: Added github to title slide
</commit_message>
<xml_diff>
--- a/My Robot Friend - Alexa.js.pptx
+++ b/My Robot Friend - Alexa.js.pptx
@@ -308,7 +308,7 @@
           <a:p>
             <a:fld id="{75A3C5B4-6199-4031-B143-8199622DDC1A}" type="datetimeFigureOut">
               <a:rPr lang="en-US" smtClean="0"/>
-              <a:t>8/10/2016</a:t>
+              <a:t>8/11/2016</a:t>
             </a:fld>
             <a:endParaRPr lang="en-US"/>
           </a:p>
@@ -478,7 +478,7 @@
           <a:p>
             <a:fld id="{75A3C5B4-6199-4031-B143-8199622DDC1A}" type="datetimeFigureOut">
               <a:rPr lang="en-US" smtClean="0"/>
-              <a:t>8/10/2016</a:t>
+              <a:t>8/11/2016</a:t>
             </a:fld>
             <a:endParaRPr lang="en-US"/>
           </a:p>
@@ -658,7 +658,7 @@
           <a:p>
             <a:fld id="{75A3C5B4-6199-4031-B143-8199622DDC1A}" type="datetimeFigureOut">
               <a:rPr lang="en-US" smtClean="0"/>
-              <a:t>8/10/2016</a:t>
+              <a:t>8/11/2016</a:t>
             </a:fld>
             <a:endParaRPr lang="en-US"/>
           </a:p>
@@ -828,7 +828,7 @@
           <a:p>
             <a:fld id="{75A3C5B4-6199-4031-B143-8199622DDC1A}" type="datetimeFigureOut">
               <a:rPr lang="en-US" smtClean="0"/>
-              <a:t>8/10/2016</a:t>
+              <a:t>8/11/2016</a:t>
             </a:fld>
             <a:endParaRPr lang="en-US"/>
           </a:p>
@@ -1074,7 +1074,7 @@
           <a:p>
             <a:fld id="{75A3C5B4-6199-4031-B143-8199622DDC1A}" type="datetimeFigureOut">
               <a:rPr lang="en-US" smtClean="0"/>
-              <a:t>8/10/2016</a:t>
+              <a:t>8/11/2016</a:t>
             </a:fld>
             <a:endParaRPr lang="en-US"/>
           </a:p>
@@ -1362,7 +1362,7 @@
           <a:p>
             <a:fld id="{75A3C5B4-6199-4031-B143-8199622DDC1A}" type="datetimeFigureOut">
               <a:rPr lang="en-US" smtClean="0"/>
-              <a:t>8/10/2016</a:t>
+              <a:t>8/11/2016</a:t>
             </a:fld>
             <a:endParaRPr lang="en-US"/>
           </a:p>
@@ -1784,7 +1784,7 @@
           <a:p>
             <a:fld id="{75A3C5B4-6199-4031-B143-8199622DDC1A}" type="datetimeFigureOut">
               <a:rPr lang="en-US" smtClean="0"/>
-              <a:t>8/10/2016</a:t>
+              <a:t>8/11/2016</a:t>
             </a:fld>
             <a:endParaRPr lang="en-US"/>
           </a:p>
@@ -1902,7 +1902,7 @@
           <a:p>
             <a:fld id="{75A3C5B4-6199-4031-B143-8199622DDC1A}" type="datetimeFigureOut">
               <a:rPr lang="en-US" smtClean="0"/>
-              <a:t>8/10/2016</a:t>
+              <a:t>8/11/2016</a:t>
             </a:fld>
             <a:endParaRPr lang="en-US"/>
           </a:p>
@@ -1997,7 +1997,7 @@
           <a:p>
             <a:fld id="{75A3C5B4-6199-4031-B143-8199622DDC1A}" type="datetimeFigureOut">
               <a:rPr lang="en-US" smtClean="0"/>
-              <a:t>8/10/2016</a:t>
+              <a:t>8/11/2016</a:t>
             </a:fld>
             <a:endParaRPr lang="en-US"/>
           </a:p>
@@ -2274,7 +2274,7 @@
           <a:p>
             <a:fld id="{75A3C5B4-6199-4031-B143-8199622DDC1A}" type="datetimeFigureOut">
               <a:rPr lang="en-US" smtClean="0"/>
-              <a:t>8/10/2016</a:t>
+              <a:t>8/11/2016</a:t>
             </a:fld>
             <a:endParaRPr lang="en-US"/>
           </a:p>
@@ -2527,7 +2527,7 @@
           <a:p>
             <a:fld id="{75A3C5B4-6199-4031-B143-8199622DDC1A}" type="datetimeFigureOut">
               <a:rPr lang="en-US" smtClean="0"/>
-              <a:t>8/10/2016</a:t>
+              <a:t>8/11/2016</a:t>
             </a:fld>
             <a:endParaRPr lang="en-US"/>
           </a:p>
@@ -2740,7 +2740,7 @@
           <a:p>
             <a:fld id="{75A3C5B4-6199-4031-B143-8199622DDC1A}" type="datetimeFigureOut">
               <a:rPr lang="en-US" smtClean="0"/>
-              <a:t>8/10/2016</a:t>
+              <a:t>8/11/2016</a:t>
             </a:fld>
             <a:endParaRPr lang="en-US"/>
           </a:p>
@@ -3176,12 +3176,15 @@
           </a:p>
           <a:p>
             <a:r>
-              <a:rPr lang="en-US" dirty="0" smtClean="0"/>
-              <a:t>@</a:t>
-            </a:r>
-            <a:r>
               <a:rPr lang="en-US" dirty="0" err="1" smtClean="0"/>
               <a:t>thekeithchester</a:t>
+            </a:r>
+            <a:endParaRPr lang="en-US" dirty="0" smtClean="0"/>
+          </a:p>
+          <a:p>
+            <a:r>
+              <a:rPr lang="en-US" dirty="0" err="1" smtClean="0"/>
+              <a:t>hlfshell</a:t>
             </a:r>
             <a:endParaRPr lang="en-US" dirty="0"/>
           </a:p>
@@ -3374,6 +3377,88 @@
           </a:p>
         </p:txBody>
       </p:sp>
+      <p:pic>
+        <p:nvPicPr>
+          <p:cNvPr id="1030" name="Picture 6" descr="the Stormtroopocat"/>
+          <p:cNvPicPr>
+            <a:picLocks noChangeAspect="1" noChangeArrowheads="1"/>
+          </p:cNvPicPr>
+          <p:nvPr/>
+        </p:nvPicPr>
+        <p:blipFill>
+          <a:blip r:embed="rId4" cstate="print">
+            <a:extLst>
+              <a:ext uri="{28A0092B-C50C-407E-A947-70E740481C1C}">
+                <a14:useLocalDpi xmlns:a14="http://schemas.microsoft.com/office/drawing/2010/main" val="0"/>
+              </a:ext>
+            </a:extLst>
+          </a:blip>
+          <a:srcRect/>
+          <a:stretch>
+            <a:fillRect/>
+          </a:stretch>
+        </p:blipFill>
+        <p:spPr bwMode="auto">
+          <a:xfrm>
+            <a:off x="3200400" y="4995582"/>
+            <a:ext cx="676836" cy="676836"/>
+          </a:xfrm>
+          <a:prstGeom prst="rect">
+            <a:avLst/>
+          </a:prstGeom>
+          <a:noFill/>
+          <a:extLst>
+            <a:ext uri="{909E8E84-426E-40DD-AFC4-6F175D3DCCD1}">
+              <a14:hiddenFill xmlns:a14="http://schemas.microsoft.com/office/drawing/2010/main">
+                <a:solidFill>
+                  <a:srgbClr val="FFFFFF"/>
+                </a:solidFill>
+              </a14:hiddenFill>
+            </a:ext>
+          </a:extLst>
+        </p:spPr>
+      </p:pic>
+      <p:pic>
+        <p:nvPicPr>
+          <p:cNvPr id="1032" name="Picture 8" descr="http://logos-download.com/wp-content/uploads/2016/02/Twitter_logo_bird_transparent_png.png"/>
+          <p:cNvPicPr>
+            <a:picLocks noChangeAspect="1" noChangeArrowheads="1"/>
+          </p:cNvPicPr>
+          <p:nvPr/>
+        </p:nvPicPr>
+        <p:blipFill>
+          <a:blip r:embed="rId5" cstate="print">
+            <a:extLst>
+              <a:ext uri="{28A0092B-C50C-407E-A947-70E740481C1C}">
+                <a14:useLocalDpi xmlns:a14="http://schemas.microsoft.com/office/drawing/2010/main" val="0"/>
+              </a:ext>
+            </a:extLst>
+          </a:blip>
+          <a:srcRect/>
+          <a:stretch>
+            <a:fillRect/>
+          </a:stretch>
+        </p:blipFill>
+        <p:spPr bwMode="auto">
+          <a:xfrm>
+            <a:off x="2802995" y="4572000"/>
+            <a:ext cx="397405" cy="322693"/>
+          </a:xfrm>
+          <a:prstGeom prst="rect">
+            <a:avLst/>
+          </a:prstGeom>
+          <a:noFill/>
+          <a:extLst>
+            <a:ext uri="{909E8E84-426E-40DD-AFC4-6F175D3DCCD1}">
+              <a14:hiddenFill xmlns:a14="http://schemas.microsoft.com/office/drawing/2010/main">
+                <a:solidFill>
+                  <a:srgbClr val="FFFFFF"/>
+                </a:solidFill>
+              </a14:hiddenFill>
+            </a:ext>
+          </a:extLst>
+        </p:spPr>
+      </p:pic>
     </p:spTree>
     <p:extLst>
       <p:ext uri="{BB962C8B-B14F-4D97-AF65-F5344CB8AC3E}">
@@ -6506,15 +6591,7 @@
                   <a:srgbClr val="FF0000"/>
                 </a:solidFill>
               </a:rPr>
-              <a:t>Coming in a future </a:t>
-            </a:r>
-            <a:r>
-              <a:rPr lang="en-US" dirty="0" smtClean="0">
-                <a:solidFill>
-                  <a:srgbClr val="FF0000"/>
-                </a:solidFill>
-              </a:rPr>
-              <a:t>talk</a:t>
+              <a:t>Coming in a future talk</a:t>
             </a:r>
           </a:p>
         </p:txBody>

</xml_diff>